<commit_message>
Final release NYT #16 summer 2024
</commit_message>
<xml_diff>
--- a/Lecture slides/NYT A02 - How to Summarize.pptx
+++ b/Lecture slides/NYT A02 - How to Summarize.pptx
@@ -710,7 +710,7 @@
   <p:cSld>
     <p:spTree>
       <p:nvGrpSpPr>
-        <p:cNvPr id="32" name="Shape 32"/>
+        <p:cNvPr id="33" name="Shape 33"/>
         <p:cNvGrpSpPr/>
         <p:nvPr/>
       </p:nvGrpSpPr>
@@ -724,7 +724,7 @@
       </p:grpSpPr>
       <p:sp>
         <p:nvSpPr>
-          <p:cNvPr id="33" name="Google Shape;33;g2c22089a40d_0_66:notes"/>
+          <p:cNvPr id="34" name="Google Shape;34;g2c22089a40d_0_66:notes"/>
           <p:cNvSpPr/>
           <p:nvPr>
             <p:ph idx="2" type="sldImg"/>
@@ -759,7 +759,7 @@
       </p:sp>
       <p:sp>
         <p:nvSpPr>
-          <p:cNvPr id="34" name="Google Shape;34;g2c22089a40d_0_66:notes"/>
+          <p:cNvPr id="35" name="Google Shape;35;g2c22089a40d_0_66:notes"/>
           <p:cNvSpPr txBox="1"/>
           <p:nvPr>
             <p:ph idx="1" type="body"/>
@@ -809,7 +809,7 @@
   <p:cSld>
     <p:spTree>
       <p:nvGrpSpPr>
-        <p:cNvPr id="90" name="Shape 90"/>
+        <p:cNvPr id="91" name="Shape 91"/>
         <p:cNvGrpSpPr/>
         <p:nvPr/>
       </p:nvGrpSpPr>
@@ -823,7 +823,7 @@
       </p:grpSpPr>
       <p:sp>
         <p:nvSpPr>
-          <p:cNvPr id="91" name="Google Shape;91;g121c7c35f8a_3_27:notes"/>
+          <p:cNvPr id="92" name="Google Shape;92;g121c7c35f8a_3_27:notes"/>
           <p:cNvSpPr/>
           <p:nvPr>
             <p:ph idx="2" type="sldImg"/>
@@ -858,7 +858,7 @@
       </p:sp>
       <p:sp>
         <p:nvSpPr>
-          <p:cNvPr id="92" name="Google Shape;92;g121c7c35f8a_3_27:notes"/>
+          <p:cNvPr id="93" name="Google Shape;93;g121c7c35f8a_3_27:notes"/>
           <p:cNvSpPr txBox="1"/>
           <p:nvPr>
             <p:ph idx="1" type="body"/>
@@ -908,7 +908,7 @@
   <p:cSld>
     <p:spTree>
       <p:nvGrpSpPr>
-        <p:cNvPr id="97" name="Shape 97"/>
+        <p:cNvPr id="98" name="Shape 98"/>
         <p:cNvGrpSpPr/>
         <p:nvPr/>
       </p:nvGrpSpPr>
@@ -922,7 +922,7 @@
       </p:grpSpPr>
       <p:sp>
         <p:nvSpPr>
-          <p:cNvPr id="98" name="Google Shape;98;g10b1741a8de_0_16:notes"/>
+          <p:cNvPr id="99" name="Google Shape;99;g10b1741a8de_0_16:notes"/>
           <p:cNvSpPr/>
           <p:nvPr>
             <p:ph idx="2" type="sldImg"/>
@@ -957,7 +957,7 @@
       </p:sp>
       <p:sp>
         <p:nvSpPr>
-          <p:cNvPr id="99" name="Google Shape;99;g10b1741a8de_0_16:notes"/>
+          <p:cNvPr id="100" name="Google Shape;100;g10b1741a8de_0_16:notes"/>
           <p:cNvSpPr txBox="1"/>
           <p:nvPr>
             <p:ph idx="1" type="body"/>
@@ -1007,7 +1007,7 @@
   <p:cSld>
     <p:spTree>
       <p:nvGrpSpPr>
-        <p:cNvPr id="102" name="Shape 102"/>
+        <p:cNvPr id="103" name="Shape 103"/>
         <p:cNvGrpSpPr/>
         <p:nvPr/>
       </p:nvGrpSpPr>
@@ -1021,7 +1021,7 @@
       </p:grpSpPr>
       <p:sp>
         <p:nvSpPr>
-          <p:cNvPr id="103" name="Google Shape;103;g121c7c35f8a_3_0:notes"/>
+          <p:cNvPr id="104" name="Google Shape;104;g121c7c35f8a_3_0:notes"/>
           <p:cNvSpPr/>
           <p:nvPr>
             <p:ph idx="2" type="sldImg"/>
@@ -1056,7 +1056,7 @@
       </p:sp>
       <p:sp>
         <p:nvSpPr>
-          <p:cNvPr id="104" name="Google Shape;104;g121c7c35f8a_3_0:notes"/>
+          <p:cNvPr id="105" name="Google Shape;105;g121c7c35f8a_3_0:notes"/>
           <p:cNvSpPr txBox="1"/>
           <p:nvPr>
             <p:ph idx="1" type="body"/>
@@ -1106,7 +1106,7 @@
   <p:cSld>
     <p:spTree>
       <p:nvGrpSpPr>
-        <p:cNvPr id="109" name="Shape 109"/>
+        <p:cNvPr id="110" name="Shape 110"/>
         <p:cNvGrpSpPr/>
         <p:nvPr/>
       </p:nvGrpSpPr>
@@ -1120,7 +1120,7 @@
       </p:grpSpPr>
       <p:sp>
         <p:nvSpPr>
-          <p:cNvPr id="110" name="Google Shape;110;g121c7c35f8a_3_33:notes"/>
+          <p:cNvPr id="111" name="Google Shape;111;g121c7c35f8a_3_33:notes"/>
           <p:cNvSpPr/>
           <p:nvPr>
             <p:ph idx="2" type="sldImg"/>
@@ -1155,7 +1155,7 @@
       </p:sp>
       <p:sp>
         <p:nvSpPr>
-          <p:cNvPr id="111" name="Google Shape;111;g121c7c35f8a_3_33:notes"/>
+          <p:cNvPr id="112" name="Google Shape;112;g121c7c35f8a_3_33:notes"/>
           <p:cNvSpPr txBox="1"/>
           <p:nvPr>
             <p:ph idx="1" type="body"/>
@@ -1205,7 +1205,7 @@
   <p:cSld>
     <p:spTree>
       <p:nvGrpSpPr>
-        <p:cNvPr id="116" name="Shape 116"/>
+        <p:cNvPr id="117" name="Shape 117"/>
         <p:cNvGrpSpPr/>
         <p:nvPr/>
       </p:nvGrpSpPr>
@@ -1219,7 +1219,7 @@
       </p:grpSpPr>
       <p:sp>
         <p:nvSpPr>
-          <p:cNvPr id="117" name="Google Shape;117;g121c7c35f8a_3_55:notes"/>
+          <p:cNvPr id="118" name="Google Shape;118;g121c7c35f8a_3_55:notes"/>
           <p:cNvSpPr/>
           <p:nvPr>
             <p:ph idx="2" type="sldImg"/>
@@ -1254,7 +1254,7 @@
       </p:sp>
       <p:sp>
         <p:nvSpPr>
-          <p:cNvPr id="118" name="Google Shape;118;g121c7c35f8a_3_55:notes"/>
+          <p:cNvPr id="119" name="Google Shape;119;g121c7c35f8a_3_55:notes"/>
           <p:cNvSpPr txBox="1"/>
           <p:nvPr>
             <p:ph idx="1" type="body"/>
@@ -1304,7 +1304,7 @@
   <p:cSld>
     <p:spTree>
       <p:nvGrpSpPr>
-        <p:cNvPr id="123" name="Shape 123"/>
+        <p:cNvPr id="124" name="Shape 124"/>
         <p:cNvGrpSpPr/>
         <p:nvPr/>
       </p:nvGrpSpPr>
@@ -1318,7 +1318,7 @@
       </p:grpSpPr>
       <p:sp>
         <p:nvSpPr>
-          <p:cNvPr id="124" name="Google Shape;124;g121c7c35f8a_3_74:notes"/>
+          <p:cNvPr id="125" name="Google Shape;125;g121c7c35f8a_3_74:notes"/>
           <p:cNvSpPr/>
           <p:nvPr>
             <p:ph idx="2" type="sldImg"/>
@@ -1353,7 +1353,7 @@
       </p:sp>
       <p:sp>
         <p:nvSpPr>
-          <p:cNvPr id="125" name="Google Shape;125;g121c7c35f8a_3_74:notes"/>
+          <p:cNvPr id="126" name="Google Shape;126;g121c7c35f8a_3_74:notes"/>
           <p:cNvSpPr txBox="1"/>
           <p:nvPr>
             <p:ph idx="1" type="body"/>
@@ -1403,7 +1403,7 @@
   <p:cSld>
     <p:spTree>
       <p:nvGrpSpPr>
-        <p:cNvPr id="130" name="Shape 130"/>
+        <p:cNvPr id="131" name="Shape 131"/>
         <p:cNvGrpSpPr/>
         <p:nvPr/>
       </p:nvGrpSpPr>
@@ -1417,7 +1417,7 @@
       </p:grpSpPr>
       <p:sp>
         <p:nvSpPr>
-          <p:cNvPr id="131" name="Google Shape;131;g121c7c35f8a_3_49:notes"/>
+          <p:cNvPr id="132" name="Google Shape;132;g121c7c35f8a_3_49:notes"/>
           <p:cNvSpPr/>
           <p:nvPr>
             <p:ph idx="2" type="sldImg"/>
@@ -1452,7 +1452,7 @@
       </p:sp>
       <p:sp>
         <p:nvSpPr>
-          <p:cNvPr id="132" name="Google Shape;132;g121c7c35f8a_3_49:notes"/>
+          <p:cNvPr id="133" name="Google Shape;133;g121c7c35f8a_3_49:notes"/>
           <p:cNvSpPr txBox="1"/>
           <p:nvPr>
             <p:ph idx="1" type="body"/>
@@ -1502,7 +1502,7 @@
   <p:cSld>
     <p:spTree>
       <p:nvGrpSpPr>
-        <p:cNvPr id="137" name="Shape 137"/>
+        <p:cNvPr id="138" name="Shape 138"/>
         <p:cNvGrpSpPr/>
         <p:nvPr/>
       </p:nvGrpSpPr>
@@ -1516,7 +1516,7 @@
       </p:grpSpPr>
       <p:sp>
         <p:nvSpPr>
-          <p:cNvPr id="138" name="Google Shape;138;g121c7c3660d_0_0:notes"/>
+          <p:cNvPr id="139" name="Google Shape;139;g121c7c3660d_0_0:notes"/>
           <p:cNvSpPr/>
           <p:nvPr>
             <p:ph idx="2" type="sldImg"/>
@@ -1551,7 +1551,7 @@
       </p:sp>
       <p:sp>
         <p:nvSpPr>
-          <p:cNvPr id="139" name="Google Shape;139;g121c7c3660d_0_0:notes"/>
+          <p:cNvPr id="140" name="Google Shape;140;g121c7c3660d_0_0:notes"/>
           <p:cNvSpPr txBox="1"/>
           <p:nvPr>
             <p:ph idx="1" type="body"/>
@@ -1601,7 +1601,7 @@
   <p:cSld>
     <p:spTree>
       <p:nvGrpSpPr>
-        <p:cNvPr id="145" name="Shape 145"/>
+        <p:cNvPr id="146" name="Shape 146"/>
         <p:cNvGrpSpPr/>
         <p:nvPr/>
       </p:nvGrpSpPr>
@@ -1615,7 +1615,7 @@
       </p:grpSpPr>
       <p:sp>
         <p:nvSpPr>
-          <p:cNvPr id="146" name="Google Shape;146;g10b1741a8de_0_6:notes"/>
+          <p:cNvPr id="147" name="Google Shape;147;g10b1741a8de_0_6:notes"/>
           <p:cNvSpPr/>
           <p:nvPr>
             <p:ph idx="2" type="sldImg"/>
@@ -1650,7 +1650,7 @@
       </p:sp>
       <p:sp>
         <p:nvSpPr>
-          <p:cNvPr id="147" name="Google Shape;147;g10b1741a8de_0_6:notes"/>
+          <p:cNvPr id="148" name="Google Shape;148;g10b1741a8de_0_6:notes"/>
           <p:cNvSpPr txBox="1"/>
           <p:nvPr>
             <p:ph idx="1" type="body"/>
@@ -1700,7 +1700,7 @@
   <p:cSld>
     <p:spTree>
       <p:nvGrpSpPr>
-        <p:cNvPr id="152" name="Shape 152"/>
+        <p:cNvPr id="153" name="Shape 153"/>
         <p:cNvGrpSpPr/>
         <p:nvPr/>
       </p:nvGrpSpPr>
@@ -1714,7 +1714,7 @@
       </p:grpSpPr>
       <p:sp>
         <p:nvSpPr>
-          <p:cNvPr id="153" name="Google Shape;153;g239571bf2ad_0_38:notes"/>
+          <p:cNvPr id="154" name="Google Shape;154;g239571bf2ad_0_38:notes"/>
           <p:cNvSpPr/>
           <p:nvPr>
             <p:ph idx="2" type="sldImg"/>
@@ -1749,7 +1749,7 @@
       </p:sp>
       <p:sp>
         <p:nvSpPr>
-          <p:cNvPr id="154" name="Google Shape;154;g239571bf2ad_0_38:notes"/>
+          <p:cNvPr id="155" name="Google Shape;155;g239571bf2ad_0_38:notes"/>
           <p:cNvSpPr txBox="1"/>
           <p:nvPr>
             <p:ph idx="1" type="body"/>
@@ -1799,7 +1799,7 @@
   <p:cSld>
     <p:spTree>
       <p:nvGrpSpPr>
-        <p:cNvPr id="38" name="Shape 38"/>
+        <p:cNvPr id="39" name="Shape 39"/>
         <p:cNvGrpSpPr/>
         <p:nvPr/>
       </p:nvGrpSpPr>
@@ -1813,7 +1813,7 @@
       </p:grpSpPr>
       <p:sp>
         <p:nvSpPr>
-          <p:cNvPr id="39" name="Google Shape;39;g10b1741a8de_0_0:notes"/>
+          <p:cNvPr id="40" name="Google Shape;40;g10b1741a8de_0_0:notes"/>
           <p:cNvSpPr/>
           <p:nvPr>
             <p:ph idx="2" type="sldImg"/>
@@ -1848,7 +1848,7 @@
       </p:sp>
       <p:sp>
         <p:nvSpPr>
-          <p:cNvPr id="40" name="Google Shape;40;g10b1741a8de_0_0:notes"/>
+          <p:cNvPr id="41" name="Google Shape;41;g10b1741a8de_0_0:notes"/>
           <p:cNvSpPr txBox="1"/>
           <p:nvPr>
             <p:ph idx="1" type="body"/>
@@ -1898,7 +1898,7 @@
   <p:cSld>
     <p:spTree>
       <p:nvGrpSpPr>
-        <p:cNvPr id="158" name="Shape 158"/>
+        <p:cNvPr id="159" name="Shape 159"/>
         <p:cNvGrpSpPr/>
         <p:nvPr/>
       </p:nvGrpSpPr>
@@ -1912,7 +1912,7 @@
       </p:grpSpPr>
       <p:sp>
         <p:nvSpPr>
-          <p:cNvPr id="159" name="Google Shape;159;g239571bf2ad_0_43:notes"/>
+          <p:cNvPr id="160" name="Google Shape;160;g239571bf2ad_0_43:notes"/>
           <p:cNvSpPr/>
           <p:nvPr>
             <p:ph idx="2" type="sldImg"/>
@@ -1947,7 +1947,7 @@
       </p:sp>
       <p:sp>
         <p:nvSpPr>
-          <p:cNvPr id="160" name="Google Shape;160;g239571bf2ad_0_43:notes"/>
+          <p:cNvPr id="161" name="Google Shape;161;g239571bf2ad_0_43:notes"/>
           <p:cNvSpPr txBox="1"/>
           <p:nvPr>
             <p:ph idx="1" type="body"/>
@@ -1997,7 +1997,7 @@
   <p:cSld>
     <p:spTree>
       <p:nvGrpSpPr>
-        <p:cNvPr id="45" name="Shape 45"/>
+        <p:cNvPr id="46" name="Shape 46"/>
         <p:cNvGrpSpPr/>
         <p:nvPr/>
       </p:nvGrpSpPr>
@@ -2011,7 +2011,7 @@
       </p:grpSpPr>
       <p:sp>
         <p:nvSpPr>
-          <p:cNvPr id="46" name="Google Shape;46;gf9bad1e87a_0_0:notes"/>
+          <p:cNvPr id="47" name="Google Shape;47;gf9bad1e87a_0_0:notes"/>
           <p:cNvSpPr/>
           <p:nvPr>
             <p:ph idx="2" type="sldImg"/>
@@ -2046,7 +2046,7 @@
       </p:sp>
       <p:sp>
         <p:nvSpPr>
-          <p:cNvPr id="47" name="Google Shape;47;gf9bad1e87a_0_0:notes"/>
+          <p:cNvPr id="48" name="Google Shape;48;gf9bad1e87a_0_0:notes"/>
           <p:cNvSpPr txBox="1"/>
           <p:nvPr>
             <p:ph idx="1" type="body"/>
@@ -2096,7 +2096,7 @@
   <p:cSld>
     <p:spTree>
       <p:nvGrpSpPr>
-        <p:cNvPr id="50" name="Shape 50"/>
+        <p:cNvPr id="51" name="Shape 51"/>
         <p:cNvGrpSpPr/>
         <p:nvPr/>
       </p:nvGrpSpPr>
@@ -2110,7 +2110,7 @@
       </p:grpSpPr>
       <p:sp>
         <p:nvSpPr>
-          <p:cNvPr id="51" name="Google Shape;51;g10b1741a8de_0_20:notes"/>
+          <p:cNvPr id="52" name="Google Shape;52;g10b1741a8de_0_20:notes"/>
           <p:cNvSpPr/>
           <p:nvPr>
             <p:ph idx="2" type="sldImg"/>
@@ -2145,7 +2145,7 @@
       </p:sp>
       <p:sp>
         <p:nvSpPr>
-          <p:cNvPr id="52" name="Google Shape;52;g10b1741a8de_0_20:notes"/>
+          <p:cNvPr id="53" name="Google Shape;53;g10b1741a8de_0_20:notes"/>
           <p:cNvSpPr txBox="1"/>
           <p:nvPr>
             <p:ph idx="1" type="body"/>
@@ -2195,7 +2195,7 @@
   <p:cSld>
     <p:spTree>
       <p:nvGrpSpPr>
-        <p:cNvPr id="57" name="Shape 57"/>
+        <p:cNvPr id="58" name="Shape 58"/>
         <p:cNvGrpSpPr/>
         <p:nvPr/>
       </p:nvGrpSpPr>
@@ -2209,7 +2209,7 @@
       </p:grpSpPr>
       <p:sp>
         <p:nvSpPr>
-          <p:cNvPr id="58" name="Google Shape;58;g10b1741a8de_0_12:notes"/>
+          <p:cNvPr id="59" name="Google Shape;59;g10b1741a8de_0_12:notes"/>
           <p:cNvSpPr/>
           <p:nvPr>
             <p:ph idx="2" type="sldImg"/>
@@ -2244,7 +2244,7 @@
       </p:sp>
       <p:sp>
         <p:nvSpPr>
-          <p:cNvPr id="59" name="Google Shape;59;g10b1741a8de_0_12:notes"/>
+          <p:cNvPr id="60" name="Google Shape;60;g10b1741a8de_0_12:notes"/>
           <p:cNvSpPr txBox="1"/>
           <p:nvPr>
             <p:ph idx="1" type="body"/>
@@ -2294,7 +2294,7 @@
   <p:cSld>
     <p:spTree>
       <p:nvGrpSpPr>
-        <p:cNvPr id="62" name="Shape 62"/>
+        <p:cNvPr id="63" name="Shape 63"/>
         <p:cNvGrpSpPr/>
         <p:nvPr/>
       </p:nvGrpSpPr>
@@ -2308,7 +2308,7 @@
       </p:grpSpPr>
       <p:sp>
         <p:nvSpPr>
-          <p:cNvPr id="63" name="Google Shape;63;gdb5ccdfa64_0_0:notes"/>
+          <p:cNvPr id="64" name="Google Shape;64;gdb5ccdfa64_0_0:notes"/>
           <p:cNvSpPr/>
           <p:nvPr>
             <p:ph idx="2" type="sldImg"/>
@@ -2343,7 +2343,7 @@
       </p:sp>
       <p:sp>
         <p:nvSpPr>
-          <p:cNvPr id="64" name="Google Shape;64;gdb5ccdfa64_0_0:notes"/>
+          <p:cNvPr id="65" name="Google Shape;65;gdb5ccdfa64_0_0:notes"/>
           <p:cNvSpPr txBox="1"/>
           <p:nvPr>
             <p:ph idx="1" type="body"/>
@@ -2393,7 +2393,7 @@
   <p:cSld>
     <p:spTree>
       <p:nvGrpSpPr>
-        <p:cNvPr id="69" name="Shape 69"/>
+        <p:cNvPr id="70" name="Shape 70"/>
         <p:cNvGrpSpPr/>
         <p:nvPr/>
       </p:nvGrpSpPr>
@@ -2407,7 +2407,7 @@
       </p:grpSpPr>
       <p:sp>
         <p:nvSpPr>
-          <p:cNvPr id="70" name="Google Shape;70;g121c7c35f8a_3_6:notes"/>
+          <p:cNvPr id="71" name="Google Shape;71;g121c7c35f8a_3_6:notes"/>
           <p:cNvSpPr/>
           <p:nvPr>
             <p:ph idx="2" type="sldImg"/>
@@ -2442,7 +2442,7 @@
       </p:sp>
       <p:sp>
         <p:nvSpPr>
-          <p:cNvPr id="71" name="Google Shape;71;g121c7c35f8a_3_6:notes"/>
+          <p:cNvPr id="72" name="Google Shape;72;g121c7c35f8a_3_6:notes"/>
           <p:cNvSpPr txBox="1"/>
           <p:nvPr>
             <p:ph idx="1" type="body"/>
@@ -2492,7 +2492,7 @@
   <p:cSld>
     <p:spTree>
       <p:nvGrpSpPr>
-        <p:cNvPr id="76" name="Shape 76"/>
+        <p:cNvPr id="77" name="Shape 77"/>
         <p:cNvGrpSpPr/>
         <p:nvPr/>
       </p:nvGrpSpPr>
@@ -2506,7 +2506,7 @@
       </p:grpSpPr>
       <p:sp>
         <p:nvSpPr>
-          <p:cNvPr id="77" name="Google Shape;77;g121c7c35f8a_3_13:notes"/>
+          <p:cNvPr id="78" name="Google Shape;78;g121c7c35f8a_3_13:notes"/>
           <p:cNvSpPr/>
           <p:nvPr>
             <p:ph idx="2" type="sldImg"/>
@@ -2541,7 +2541,7 @@
       </p:sp>
       <p:sp>
         <p:nvSpPr>
-          <p:cNvPr id="78" name="Google Shape;78;g121c7c35f8a_3_13:notes"/>
+          <p:cNvPr id="79" name="Google Shape;79;g121c7c35f8a_3_13:notes"/>
           <p:cNvSpPr txBox="1"/>
           <p:nvPr>
             <p:ph idx="1" type="body"/>
@@ -2591,7 +2591,7 @@
   <p:cSld>
     <p:spTree>
       <p:nvGrpSpPr>
-        <p:cNvPr id="83" name="Shape 83"/>
+        <p:cNvPr id="84" name="Shape 84"/>
         <p:cNvGrpSpPr/>
         <p:nvPr/>
       </p:nvGrpSpPr>
@@ -2605,7 +2605,7 @@
       </p:grpSpPr>
       <p:sp>
         <p:nvSpPr>
-          <p:cNvPr id="84" name="Google Shape;84;g121c7c35f8a_3_21:notes"/>
+          <p:cNvPr id="85" name="Google Shape;85;g121c7c35f8a_3_21:notes"/>
           <p:cNvSpPr/>
           <p:nvPr>
             <p:ph idx="2" type="sldImg"/>
@@ -2640,7 +2640,7 @@
       </p:sp>
       <p:sp>
         <p:nvSpPr>
-          <p:cNvPr id="85" name="Google Shape;85;g121c7c35f8a_3_21:notes"/>
+          <p:cNvPr id="86" name="Google Shape;86;g121c7c35f8a_3_21:notes"/>
           <p:cNvSpPr txBox="1"/>
           <p:nvPr>
             <p:ph idx="1" type="body"/>
@@ -3223,6 +3223,144 @@
           </a:p>
         </p:txBody>
       </p:sp>
+      <p:sp>
+        <p:nvSpPr>
+          <p:cNvPr id="16" name="Google Shape;16;p3"/>
+          <p:cNvSpPr txBox="1"/>
+          <p:nvPr>
+            <p:ph idx="12" type="sldNum"/>
+          </p:nvPr>
+        </p:nvSpPr>
+        <p:spPr>
+          <a:xfrm>
+            <a:off x="7315209" y="4229101"/>
+            <a:ext cx="1828800" cy="914400"/>
+          </a:xfrm>
+          <a:prstGeom prst="rect">
+            <a:avLst/>
+          </a:prstGeom>
+        </p:spPr>
+        <p:txBody>
+          <a:bodyPr anchorCtr="0" anchor="b" bIns="91425" lIns="91425" spcFirstLastPara="1" rIns="91425" wrap="square" tIns="91425">
+            <a:noAutofit/>
+          </a:bodyPr>
+          <a:lstStyle>
+            <a:lvl1pPr lvl="0" rtl="0" algn="r">
+              <a:buNone/>
+              <a:defRPr b="1" sz="2400">
+                <a:solidFill>
+                  <a:schemeClr val="dk1"/>
+                </a:solidFill>
+              </a:defRPr>
+            </a:lvl1pPr>
+            <a:lvl2pPr lvl="1" rtl="0" algn="r">
+              <a:buNone/>
+              <a:defRPr b="1" sz="2400">
+                <a:solidFill>
+                  <a:schemeClr val="dk1"/>
+                </a:solidFill>
+              </a:defRPr>
+            </a:lvl2pPr>
+            <a:lvl3pPr lvl="2" rtl="0" algn="r">
+              <a:buNone/>
+              <a:defRPr b="1" sz="2400">
+                <a:solidFill>
+                  <a:schemeClr val="dk1"/>
+                </a:solidFill>
+              </a:defRPr>
+            </a:lvl3pPr>
+            <a:lvl4pPr lvl="3" rtl="0" algn="r">
+              <a:buNone/>
+              <a:defRPr b="1" sz="2400">
+                <a:solidFill>
+                  <a:schemeClr val="dk1"/>
+                </a:solidFill>
+              </a:defRPr>
+            </a:lvl4pPr>
+            <a:lvl5pPr lvl="4" rtl="0" algn="r">
+              <a:buNone/>
+              <a:defRPr b="1" sz="2400">
+                <a:solidFill>
+                  <a:schemeClr val="dk1"/>
+                </a:solidFill>
+              </a:defRPr>
+            </a:lvl5pPr>
+            <a:lvl6pPr lvl="5" rtl="0" algn="r">
+              <a:buNone/>
+              <a:defRPr b="1" sz="2400">
+                <a:solidFill>
+                  <a:schemeClr val="dk1"/>
+                </a:solidFill>
+              </a:defRPr>
+            </a:lvl6pPr>
+            <a:lvl7pPr lvl="6" rtl="0" algn="r">
+              <a:buNone/>
+              <a:defRPr b="1" sz="2400">
+                <a:solidFill>
+                  <a:schemeClr val="dk1"/>
+                </a:solidFill>
+              </a:defRPr>
+            </a:lvl7pPr>
+            <a:lvl8pPr lvl="7" rtl="0" algn="r">
+              <a:buNone/>
+              <a:defRPr b="1" sz="2400">
+                <a:solidFill>
+                  <a:schemeClr val="dk1"/>
+                </a:solidFill>
+              </a:defRPr>
+            </a:lvl8pPr>
+            <a:lvl9pPr lvl="8" rtl="0" algn="r">
+              <a:buNone/>
+              <a:defRPr b="1" sz="2400">
+                <a:solidFill>
+                  <a:schemeClr val="dk1"/>
+                </a:solidFill>
+              </a:defRPr>
+            </a:lvl9pPr>
+          </a:lstStyle>
+          <a:p>
+            <a:pPr indent="0" lvl="0" marL="0" rtl="0" algn="r">
+              <a:spcBef>
+                <a:spcPts val="0"/>
+              </a:spcBef>
+              <a:spcAft>
+                <a:spcPts val="0"/>
+              </a:spcAft>
+              <a:buNone/>
+            </a:pPr>
+            <a:fld id="{00000000-1234-1234-1234-123412341234}" type="slidenum">
+              <a:rPr lang="en"/>
+              <a:t>‹#›</a:t>
+            </a:fld>
+            <a:endParaRPr/>
+          </a:p>
+          <a:p>
+            <a:pPr indent="0" lvl="0" marL="0" rtl="0" algn="r">
+              <a:spcBef>
+                <a:spcPts val="0"/>
+              </a:spcBef>
+              <a:spcAft>
+                <a:spcPts val="0"/>
+              </a:spcAft>
+              <a:buNone/>
+            </a:pPr>
+            <a:r>
+              <a:rPr b="0" lang="en" sz="1000" u="sng">
+                <a:solidFill>
+                  <a:schemeClr val="hlink"/>
+                </a:solidFill>
+                <a:hlinkClick r:id="rId2"/>
+              </a:rPr>
+              <a:t>uni1.de/nyt</a:t>
+            </a:r>
+            <a:r>
+              <a:rPr b="0" lang="en" sz="1000"/>
+              <a:t> </a:t>
+            </a:r>
+            <a:endParaRPr b="0" sz="1000"/>
+          </a:p>
+        </p:txBody>
+      </p:sp>
     </p:spTree>
   </p:cSld>
   <p:clrMapOvr>
@@ -3236,7 +3374,7 @@
   <p:cSld name="TITLE_AND_BODY">
     <p:spTree>
       <p:nvGrpSpPr>
-        <p:cNvPr id="16" name="Shape 16"/>
+        <p:cNvPr id="17" name="Shape 17"/>
         <p:cNvGrpSpPr/>
         <p:nvPr/>
       </p:nvGrpSpPr>
@@ -3250,7 +3388,7 @@
       </p:grpSpPr>
       <p:sp>
         <p:nvSpPr>
-          <p:cNvPr id="17" name="Google Shape;17;p4"/>
+          <p:cNvPr id="18" name="Google Shape;18;p4"/>
           <p:cNvSpPr txBox="1"/>
           <p:nvPr>
             <p:ph type="title"/>
@@ -3375,7 +3513,7 @@
       </p:sp>
       <p:sp>
         <p:nvSpPr>
-          <p:cNvPr id="18" name="Google Shape;18;p4"/>
+          <p:cNvPr id="19" name="Google Shape;19;p4"/>
           <p:cNvSpPr txBox="1"/>
           <p:nvPr>
             <p:ph idx="1" type="body"/>
@@ -3496,152 +3634,6 @@
             </a:lvl9pPr>
           </a:lstStyle>
           <a:p/>
-        </p:txBody>
-      </p:sp>
-      <p:sp>
-        <p:nvSpPr>
-          <p:cNvPr id="19" name="Google Shape;19;p4"/>
-          <p:cNvSpPr txBox="1"/>
-          <p:nvPr>
-            <p:ph idx="12" type="sldNum"/>
-          </p:nvPr>
-        </p:nvSpPr>
-        <p:spPr>
-          <a:xfrm>
-            <a:off x="7315202" y="4416550"/>
-            <a:ext cx="1828800" cy="731400"/>
-          </a:xfrm>
-          <a:prstGeom prst="rect">
-            <a:avLst/>
-          </a:prstGeom>
-        </p:spPr>
-        <p:txBody>
-          <a:bodyPr anchorCtr="0" anchor="b" bIns="91425" lIns="91425" spcFirstLastPara="1" rIns="91425" wrap="square" tIns="91425">
-            <a:noAutofit/>
-          </a:bodyPr>
-          <a:lstStyle>
-            <a:lvl1pPr lvl="0" rtl="0">
-              <a:buNone/>
-              <a:defRPr>
-                <a:solidFill>
-                  <a:schemeClr val="dk1"/>
-                </a:solidFill>
-              </a:defRPr>
-            </a:lvl1pPr>
-            <a:lvl2pPr lvl="1" rtl="0">
-              <a:buNone/>
-              <a:defRPr>
-                <a:solidFill>
-                  <a:schemeClr val="dk1"/>
-                </a:solidFill>
-              </a:defRPr>
-            </a:lvl2pPr>
-            <a:lvl3pPr lvl="2" rtl="0">
-              <a:buNone/>
-              <a:defRPr>
-                <a:solidFill>
-                  <a:schemeClr val="dk1"/>
-                </a:solidFill>
-              </a:defRPr>
-            </a:lvl3pPr>
-            <a:lvl4pPr lvl="3" rtl="0">
-              <a:buNone/>
-              <a:defRPr>
-                <a:solidFill>
-                  <a:schemeClr val="dk1"/>
-                </a:solidFill>
-              </a:defRPr>
-            </a:lvl4pPr>
-            <a:lvl5pPr lvl="4" rtl="0">
-              <a:buNone/>
-              <a:defRPr>
-                <a:solidFill>
-                  <a:schemeClr val="dk1"/>
-                </a:solidFill>
-              </a:defRPr>
-            </a:lvl5pPr>
-            <a:lvl6pPr lvl="5" rtl="0">
-              <a:buNone/>
-              <a:defRPr>
-                <a:solidFill>
-                  <a:schemeClr val="dk1"/>
-                </a:solidFill>
-              </a:defRPr>
-            </a:lvl6pPr>
-            <a:lvl7pPr lvl="6" rtl="0">
-              <a:buNone/>
-              <a:defRPr>
-                <a:solidFill>
-                  <a:schemeClr val="dk1"/>
-                </a:solidFill>
-              </a:defRPr>
-            </a:lvl7pPr>
-            <a:lvl8pPr lvl="7" rtl="0">
-              <a:buNone/>
-              <a:defRPr>
-                <a:solidFill>
-                  <a:schemeClr val="dk1"/>
-                </a:solidFill>
-              </a:defRPr>
-            </a:lvl8pPr>
-            <a:lvl9pPr lvl="8" rtl="0">
-              <a:buNone/>
-              <a:defRPr>
-                <a:solidFill>
-                  <a:schemeClr val="dk1"/>
-                </a:solidFill>
-              </a:defRPr>
-            </a:lvl9pPr>
-          </a:lstStyle>
-          <a:p>
-            <a:pPr indent="0" lvl="0" marL="0" rtl="0" algn="r">
-              <a:spcBef>
-                <a:spcPts val="0"/>
-              </a:spcBef>
-              <a:spcAft>
-                <a:spcPts val="0"/>
-              </a:spcAft>
-              <a:buNone/>
-            </a:pPr>
-            <a:fld id="{00000000-1234-1234-1234-123412341234}" type="slidenum">
-              <a:rPr lang="en"/>
-              <a:t>‹#›</a:t>
-            </a:fld>
-            <a:endParaRPr/>
-          </a:p>
-          <a:p>
-            <a:pPr indent="0" lvl="0" marL="0" rtl="0" algn="r">
-              <a:spcBef>
-                <a:spcPts val="0"/>
-              </a:spcBef>
-              <a:spcAft>
-                <a:spcPts val="0"/>
-              </a:spcAft>
-              <a:buNone/>
-            </a:pPr>
-            <a:r>
-              <a:rPr b="0" lang="en" sz="900" u="sng">
-                <a:solidFill>
-                  <a:schemeClr val="hlink"/>
-                </a:solidFill>
-                <a:hlinkClick r:id="rId2"/>
-              </a:rPr>
-              <a:t>https://profriehle.com</a:t>
-            </a:r>
-            <a:r>
-              <a:rPr b="0" lang="en" sz="900">
-                <a:solidFill>
-                  <a:schemeClr val="dk2"/>
-                </a:solidFill>
-              </a:rPr>
-              <a:t> </a:t>
-            </a:r>
-            <a:endParaRPr b="0" sz="900">
-              <a:solidFill>
-                <a:schemeClr val="dk2"/>
-              </a:solidFill>
-            </a:endParaRPr>
-          </a:p>
         </p:txBody>
       </p:sp>
       <p:sp>
@@ -3687,6 +3679,144 @@
           </a:p>
         </p:txBody>
       </p:sp>
+      <p:sp>
+        <p:nvSpPr>
+          <p:cNvPr id="21" name="Google Shape;21;p4"/>
+          <p:cNvSpPr txBox="1"/>
+          <p:nvPr>
+            <p:ph idx="12" type="sldNum"/>
+          </p:nvPr>
+        </p:nvSpPr>
+        <p:spPr>
+          <a:xfrm>
+            <a:off x="7315209" y="4229101"/>
+            <a:ext cx="1828800" cy="914400"/>
+          </a:xfrm>
+          <a:prstGeom prst="rect">
+            <a:avLst/>
+          </a:prstGeom>
+        </p:spPr>
+        <p:txBody>
+          <a:bodyPr anchorCtr="0" anchor="b" bIns="91425" lIns="91425" spcFirstLastPara="1" rIns="91425" wrap="square" tIns="91425">
+            <a:noAutofit/>
+          </a:bodyPr>
+          <a:lstStyle>
+            <a:lvl1pPr lvl="0" rtl="0" algn="r">
+              <a:buNone/>
+              <a:defRPr b="1" sz="2400">
+                <a:solidFill>
+                  <a:schemeClr val="dk1"/>
+                </a:solidFill>
+              </a:defRPr>
+            </a:lvl1pPr>
+            <a:lvl2pPr lvl="1" rtl="0" algn="r">
+              <a:buNone/>
+              <a:defRPr b="1" sz="2400">
+                <a:solidFill>
+                  <a:schemeClr val="dk1"/>
+                </a:solidFill>
+              </a:defRPr>
+            </a:lvl2pPr>
+            <a:lvl3pPr lvl="2" rtl="0" algn="r">
+              <a:buNone/>
+              <a:defRPr b="1" sz="2400">
+                <a:solidFill>
+                  <a:schemeClr val="dk1"/>
+                </a:solidFill>
+              </a:defRPr>
+            </a:lvl3pPr>
+            <a:lvl4pPr lvl="3" rtl="0" algn="r">
+              <a:buNone/>
+              <a:defRPr b="1" sz="2400">
+                <a:solidFill>
+                  <a:schemeClr val="dk1"/>
+                </a:solidFill>
+              </a:defRPr>
+            </a:lvl4pPr>
+            <a:lvl5pPr lvl="4" rtl="0" algn="r">
+              <a:buNone/>
+              <a:defRPr b="1" sz="2400">
+                <a:solidFill>
+                  <a:schemeClr val="dk1"/>
+                </a:solidFill>
+              </a:defRPr>
+            </a:lvl5pPr>
+            <a:lvl6pPr lvl="5" rtl="0" algn="r">
+              <a:buNone/>
+              <a:defRPr b="1" sz="2400">
+                <a:solidFill>
+                  <a:schemeClr val="dk1"/>
+                </a:solidFill>
+              </a:defRPr>
+            </a:lvl6pPr>
+            <a:lvl7pPr lvl="6" rtl="0" algn="r">
+              <a:buNone/>
+              <a:defRPr b="1" sz="2400">
+                <a:solidFill>
+                  <a:schemeClr val="dk1"/>
+                </a:solidFill>
+              </a:defRPr>
+            </a:lvl7pPr>
+            <a:lvl8pPr lvl="7" rtl="0" algn="r">
+              <a:buNone/>
+              <a:defRPr b="1" sz="2400">
+                <a:solidFill>
+                  <a:schemeClr val="dk1"/>
+                </a:solidFill>
+              </a:defRPr>
+            </a:lvl8pPr>
+            <a:lvl9pPr lvl="8" rtl="0" algn="r">
+              <a:buNone/>
+              <a:defRPr b="1" sz="2400">
+                <a:solidFill>
+                  <a:schemeClr val="dk1"/>
+                </a:solidFill>
+              </a:defRPr>
+            </a:lvl9pPr>
+          </a:lstStyle>
+          <a:p>
+            <a:pPr indent="0" lvl="0" marL="0" rtl="0" algn="r">
+              <a:spcBef>
+                <a:spcPts val="0"/>
+              </a:spcBef>
+              <a:spcAft>
+                <a:spcPts val="0"/>
+              </a:spcAft>
+              <a:buNone/>
+            </a:pPr>
+            <a:fld id="{00000000-1234-1234-1234-123412341234}" type="slidenum">
+              <a:rPr lang="en"/>
+              <a:t>‹#›</a:t>
+            </a:fld>
+            <a:endParaRPr/>
+          </a:p>
+          <a:p>
+            <a:pPr indent="0" lvl="0" marL="0" rtl="0" algn="r">
+              <a:spcBef>
+                <a:spcPts val="0"/>
+              </a:spcBef>
+              <a:spcAft>
+                <a:spcPts val="0"/>
+              </a:spcAft>
+              <a:buNone/>
+            </a:pPr>
+            <a:r>
+              <a:rPr b="0" lang="en" sz="1000" u="sng">
+                <a:solidFill>
+                  <a:schemeClr val="hlink"/>
+                </a:solidFill>
+                <a:hlinkClick r:id="rId2"/>
+              </a:rPr>
+              <a:t>uni1.de/nyt</a:t>
+            </a:r>
+            <a:r>
+              <a:rPr b="0" lang="en" sz="1000"/>
+              <a:t> </a:t>
+            </a:r>
+            <a:endParaRPr b="0" sz="1000"/>
+          </a:p>
+        </p:txBody>
+      </p:sp>
     </p:spTree>
   </p:cSld>
   <p:clrMapOvr>
@@ -3700,7 +3830,7 @@
   <p:cSld name="TITLE_AND_TWO_COLUMNS">
     <p:spTree>
       <p:nvGrpSpPr>
-        <p:cNvPr id="21" name="Shape 21"/>
+        <p:cNvPr id="22" name="Shape 22"/>
         <p:cNvGrpSpPr/>
         <p:nvPr/>
       </p:nvGrpSpPr>
@@ -3714,7 +3844,7 @@
       </p:grpSpPr>
       <p:sp>
         <p:nvSpPr>
-          <p:cNvPr id="22" name="Google Shape;22;p5"/>
+          <p:cNvPr id="23" name="Google Shape;23;p5"/>
           <p:cNvSpPr txBox="1"/>
           <p:nvPr>
             <p:ph type="title"/>
@@ -3842,7 +3972,7 @@
       </p:sp>
       <p:sp>
         <p:nvSpPr>
-          <p:cNvPr id="23" name="Google Shape;23;p5"/>
+          <p:cNvPr id="24" name="Google Shape;24;p5"/>
           <p:cNvSpPr txBox="1"/>
           <p:nvPr>
             <p:ph idx="1" type="body"/>
@@ -3967,7 +4097,7 @@
       </p:sp>
       <p:sp>
         <p:nvSpPr>
-          <p:cNvPr id="24" name="Google Shape;24;p5"/>
+          <p:cNvPr id="25" name="Google Shape;25;p5"/>
           <p:cNvSpPr txBox="1"/>
           <p:nvPr>
             <p:ph idx="2" type="body"/>
@@ -4088,152 +4218,6 @@
             </a:lvl9pPr>
           </a:lstStyle>
           <a:p/>
-        </p:txBody>
-      </p:sp>
-      <p:sp>
-        <p:nvSpPr>
-          <p:cNvPr id="25" name="Google Shape;25;p5"/>
-          <p:cNvSpPr txBox="1"/>
-          <p:nvPr>
-            <p:ph idx="12" type="sldNum"/>
-          </p:nvPr>
-        </p:nvSpPr>
-        <p:spPr>
-          <a:xfrm>
-            <a:off x="7315202" y="4416550"/>
-            <a:ext cx="1828800" cy="731400"/>
-          </a:xfrm>
-          <a:prstGeom prst="rect">
-            <a:avLst/>
-          </a:prstGeom>
-        </p:spPr>
-        <p:txBody>
-          <a:bodyPr anchorCtr="0" anchor="b" bIns="91425" lIns="91425" spcFirstLastPara="1" rIns="91425" wrap="square" tIns="91425">
-            <a:noAutofit/>
-          </a:bodyPr>
-          <a:lstStyle>
-            <a:lvl1pPr lvl="0">
-              <a:buNone/>
-              <a:defRPr>
-                <a:solidFill>
-                  <a:schemeClr val="dk1"/>
-                </a:solidFill>
-              </a:defRPr>
-            </a:lvl1pPr>
-            <a:lvl2pPr lvl="1">
-              <a:buNone/>
-              <a:defRPr>
-                <a:solidFill>
-                  <a:schemeClr val="dk1"/>
-                </a:solidFill>
-              </a:defRPr>
-            </a:lvl2pPr>
-            <a:lvl3pPr lvl="2">
-              <a:buNone/>
-              <a:defRPr>
-                <a:solidFill>
-                  <a:schemeClr val="dk1"/>
-                </a:solidFill>
-              </a:defRPr>
-            </a:lvl3pPr>
-            <a:lvl4pPr lvl="3">
-              <a:buNone/>
-              <a:defRPr>
-                <a:solidFill>
-                  <a:schemeClr val="dk1"/>
-                </a:solidFill>
-              </a:defRPr>
-            </a:lvl4pPr>
-            <a:lvl5pPr lvl="4">
-              <a:buNone/>
-              <a:defRPr>
-                <a:solidFill>
-                  <a:schemeClr val="dk1"/>
-                </a:solidFill>
-              </a:defRPr>
-            </a:lvl5pPr>
-            <a:lvl6pPr lvl="5">
-              <a:buNone/>
-              <a:defRPr>
-                <a:solidFill>
-                  <a:schemeClr val="dk1"/>
-                </a:solidFill>
-              </a:defRPr>
-            </a:lvl6pPr>
-            <a:lvl7pPr lvl="6">
-              <a:buNone/>
-              <a:defRPr>
-                <a:solidFill>
-                  <a:schemeClr val="dk1"/>
-                </a:solidFill>
-              </a:defRPr>
-            </a:lvl7pPr>
-            <a:lvl8pPr lvl="7">
-              <a:buNone/>
-              <a:defRPr>
-                <a:solidFill>
-                  <a:schemeClr val="dk1"/>
-                </a:solidFill>
-              </a:defRPr>
-            </a:lvl8pPr>
-            <a:lvl9pPr lvl="8">
-              <a:buNone/>
-              <a:defRPr>
-                <a:solidFill>
-                  <a:schemeClr val="dk1"/>
-                </a:solidFill>
-              </a:defRPr>
-            </a:lvl9pPr>
-          </a:lstStyle>
-          <a:p>
-            <a:pPr indent="0" lvl="0" marL="0" rtl="0" algn="r">
-              <a:spcBef>
-                <a:spcPts val="0"/>
-              </a:spcBef>
-              <a:spcAft>
-                <a:spcPts val="0"/>
-              </a:spcAft>
-              <a:buNone/>
-            </a:pPr>
-            <a:fld id="{00000000-1234-1234-1234-123412341234}" type="slidenum">
-              <a:rPr lang="en"/>
-              <a:t>‹#›</a:t>
-            </a:fld>
-            <a:endParaRPr/>
-          </a:p>
-          <a:p>
-            <a:pPr indent="0" lvl="0" marL="0" rtl="0" algn="r">
-              <a:spcBef>
-                <a:spcPts val="0"/>
-              </a:spcBef>
-              <a:spcAft>
-                <a:spcPts val="0"/>
-              </a:spcAft>
-              <a:buNone/>
-            </a:pPr>
-            <a:r>
-              <a:rPr b="0" lang="en" sz="900" u="sng">
-                <a:solidFill>
-                  <a:schemeClr val="hlink"/>
-                </a:solidFill>
-                <a:hlinkClick r:id="rId2"/>
-              </a:rPr>
-              <a:t>https://profriehle.com</a:t>
-            </a:r>
-            <a:r>
-              <a:rPr b="0" lang="en" sz="900">
-                <a:solidFill>
-                  <a:schemeClr val="dk2"/>
-                </a:solidFill>
-              </a:rPr>
-              <a:t> </a:t>
-            </a:r>
-            <a:endParaRPr>
-              <a:solidFill>
-                <a:schemeClr val="dk2"/>
-              </a:solidFill>
-            </a:endParaRPr>
-          </a:p>
         </p:txBody>
       </p:sp>
       <p:sp>
@@ -4279,6 +4263,144 @@
           </a:p>
         </p:txBody>
       </p:sp>
+      <p:sp>
+        <p:nvSpPr>
+          <p:cNvPr id="27" name="Google Shape;27;p5"/>
+          <p:cNvSpPr txBox="1"/>
+          <p:nvPr>
+            <p:ph idx="12" type="sldNum"/>
+          </p:nvPr>
+        </p:nvSpPr>
+        <p:spPr>
+          <a:xfrm>
+            <a:off x="7315209" y="4229101"/>
+            <a:ext cx="1828800" cy="914400"/>
+          </a:xfrm>
+          <a:prstGeom prst="rect">
+            <a:avLst/>
+          </a:prstGeom>
+        </p:spPr>
+        <p:txBody>
+          <a:bodyPr anchorCtr="0" anchor="b" bIns="91425" lIns="91425" spcFirstLastPara="1" rIns="91425" wrap="square" tIns="91425">
+            <a:noAutofit/>
+          </a:bodyPr>
+          <a:lstStyle>
+            <a:lvl1pPr lvl="0" rtl="0" algn="r">
+              <a:buNone/>
+              <a:defRPr b="1" sz="2400">
+                <a:solidFill>
+                  <a:schemeClr val="dk1"/>
+                </a:solidFill>
+              </a:defRPr>
+            </a:lvl1pPr>
+            <a:lvl2pPr lvl="1" rtl="0" algn="r">
+              <a:buNone/>
+              <a:defRPr b="1" sz="2400">
+                <a:solidFill>
+                  <a:schemeClr val="dk1"/>
+                </a:solidFill>
+              </a:defRPr>
+            </a:lvl2pPr>
+            <a:lvl3pPr lvl="2" rtl="0" algn="r">
+              <a:buNone/>
+              <a:defRPr b="1" sz="2400">
+                <a:solidFill>
+                  <a:schemeClr val="dk1"/>
+                </a:solidFill>
+              </a:defRPr>
+            </a:lvl3pPr>
+            <a:lvl4pPr lvl="3" rtl="0" algn="r">
+              <a:buNone/>
+              <a:defRPr b="1" sz="2400">
+                <a:solidFill>
+                  <a:schemeClr val="dk1"/>
+                </a:solidFill>
+              </a:defRPr>
+            </a:lvl4pPr>
+            <a:lvl5pPr lvl="4" rtl="0" algn="r">
+              <a:buNone/>
+              <a:defRPr b="1" sz="2400">
+                <a:solidFill>
+                  <a:schemeClr val="dk1"/>
+                </a:solidFill>
+              </a:defRPr>
+            </a:lvl5pPr>
+            <a:lvl6pPr lvl="5" rtl="0" algn="r">
+              <a:buNone/>
+              <a:defRPr b="1" sz="2400">
+                <a:solidFill>
+                  <a:schemeClr val="dk1"/>
+                </a:solidFill>
+              </a:defRPr>
+            </a:lvl6pPr>
+            <a:lvl7pPr lvl="6" rtl="0" algn="r">
+              <a:buNone/>
+              <a:defRPr b="1" sz="2400">
+                <a:solidFill>
+                  <a:schemeClr val="dk1"/>
+                </a:solidFill>
+              </a:defRPr>
+            </a:lvl7pPr>
+            <a:lvl8pPr lvl="7" rtl="0" algn="r">
+              <a:buNone/>
+              <a:defRPr b="1" sz="2400">
+                <a:solidFill>
+                  <a:schemeClr val="dk1"/>
+                </a:solidFill>
+              </a:defRPr>
+            </a:lvl8pPr>
+            <a:lvl9pPr lvl="8" rtl="0" algn="r">
+              <a:buNone/>
+              <a:defRPr b="1" sz="2400">
+                <a:solidFill>
+                  <a:schemeClr val="dk1"/>
+                </a:solidFill>
+              </a:defRPr>
+            </a:lvl9pPr>
+          </a:lstStyle>
+          <a:p>
+            <a:pPr indent="0" lvl="0" marL="0" rtl="0" algn="r">
+              <a:spcBef>
+                <a:spcPts val="0"/>
+              </a:spcBef>
+              <a:spcAft>
+                <a:spcPts val="0"/>
+              </a:spcAft>
+              <a:buNone/>
+            </a:pPr>
+            <a:fld id="{00000000-1234-1234-1234-123412341234}" type="slidenum">
+              <a:rPr lang="en"/>
+              <a:t>‹#›</a:t>
+            </a:fld>
+            <a:endParaRPr/>
+          </a:p>
+          <a:p>
+            <a:pPr indent="0" lvl="0" marL="0" rtl="0" algn="r">
+              <a:spcBef>
+                <a:spcPts val="0"/>
+              </a:spcBef>
+              <a:spcAft>
+                <a:spcPts val="0"/>
+              </a:spcAft>
+              <a:buNone/>
+            </a:pPr>
+            <a:r>
+              <a:rPr b="0" lang="en" sz="1000" u="sng">
+                <a:solidFill>
+                  <a:schemeClr val="hlink"/>
+                </a:solidFill>
+                <a:hlinkClick r:id="rId2"/>
+              </a:rPr>
+              <a:t>uni1.de/nyt</a:t>
+            </a:r>
+            <a:r>
+              <a:rPr b="0" lang="en" sz="1000"/>
+              <a:t> </a:t>
+            </a:r>
+            <a:endParaRPr b="0" sz="1000"/>
+          </a:p>
+        </p:txBody>
+      </p:sp>
     </p:spTree>
   </p:cSld>
   <p:clrMapOvr>
@@ -4292,7 +4414,7 @@
   <p:cSld name="TITLE_ONLY">
     <p:spTree>
       <p:nvGrpSpPr>
-        <p:cNvPr id="27" name="Shape 27"/>
+        <p:cNvPr id="28" name="Shape 28"/>
         <p:cNvGrpSpPr/>
         <p:nvPr/>
       </p:nvGrpSpPr>
@@ -4306,7 +4428,7 @@
       </p:grpSpPr>
       <p:sp>
         <p:nvSpPr>
-          <p:cNvPr id="28" name="Google Shape;28;p6"/>
+          <p:cNvPr id="29" name="Google Shape;29;p6"/>
           <p:cNvSpPr txBox="1"/>
           <p:nvPr>
             <p:ph type="title"/>
@@ -4427,152 +4549,6 @@
             </a:lvl9pPr>
           </a:lstStyle>
           <a:p/>
-        </p:txBody>
-      </p:sp>
-      <p:sp>
-        <p:nvSpPr>
-          <p:cNvPr id="29" name="Google Shape;29;p6"/>
-          <p:cNvSpPr txBox="1"/>
-          <p:nvPr>
-            <p:ph idx="12" type="sldNum"/>
-          </p:nvPr>
-        </p:nvSpPr>
-        <p:spPr>
-          <a:xfrm>
-            <a:off x="7315202" y="4416550"/>
-            <a:ext cx="1828800" cy="731400"/>
-          </a:xfrm>
-          <a:prstGeom prst="rect">
-            <a:avLst/>
-          </a:prstGeom>
-        </p:spPr>
-        <p:txBody>
-          <a:bodyPr anchorCtr="0" anchor="b" bIns="91425" lIns="91425" spcFirstLastPara="1" rIns="91425" wrap="square" tIns="91425">
-            <a:noAutofit/>
-          </a:bodyPr>
-          <a:lstStyle>
-            <a:lvl1pPr lvl="0">
-              <a:buNone/>
-              <a:defRPr>
-                <a:solidFill>
-                  <a:schemeClr val="dk1"/>
-                </a:solidFill>
-              </a:defRPr>
-            </a:lvl1pPr>
-            <a:lvl2pPr lvl="1">
-              <a:buNone/>
-              <a:defRPr>
-                <a:solidFill>
-                  <a:schemeClr val="dk1"/>
-                </a:solidFill>
-              </a:defRPr>
-            </a:lvl2pPr>
-            <a:lvl3pPr lvl="2">
-              <a:buNone/>
-              <a:defRPr>
-                <a:solidFill>
-                  <a:schemeClr val="dk1"/>
-                </a:solidFill>
-              </a:defRPr>
-            </a:lvl3pPr>
-            <a:lvl4pPr lvl="3">
-              <a:buNone/>
-              <a:defRPr>
-                <a:solidFill>
-                  <a:schemeClr val="dk1"/>
-                </a:solidFill>
-              </a:defRPr>
-            </a:lvl4pPr>
-            <a:lvl5pPr lvl="4">
-              <a:buNone/>
-              <a:defRPr>
-                <a:solidFill>
-                  <a:schemeClr val="dk1"/>
-                </a:solidFill>
-              </a:defRPr>
-            </a:lvl5pPr>
-            <a:lvl6pPr lvl="5">
-              <a:buNone/>
-              <a:defRPr>
-                <a:solidFill>
-                  <a:schemeClr val="dk1"/>
-                </a:solidFill>
-              </a:defRPr>
-            </a:lvl6pPr>
-            <a:lvl7pPr lvl="6">
-              <a:buNone/>
-              <a:defRPr>
-                <a:solidFill>
-                  <a:schemeClr val="dk1"/>
-                </a:solidFill>
-              </a:defRPr>
-            </a:lvl7pPr>
-            <a:lvl8pPr lvl="7">
-              <a:buNone/>
-              <a:defRPr>
-                <a:solidFill>
-                  <a:schemeClr val="dk1"/>
-                </a:solidFill>
-              </a:defRPr>
-            </a:lvl8pPr>
-            <a:lvl9pPr lvl="8">
-              <a:buNone/>
-              <a:defRPr>
-                <a:solidFill>
-                  <a:schemeClr val="dk1"/>
-                </a:solidFill>
-              </a:defRPr>
-            </a:lvl9pPr>
-          </a:lstStyle>
-          <a:p>
-            <a:pPr indent="0" lvl="0" marL="0" rtl="0" algn="r">
-              <a:spcBef>
-                <a:spcPts val="0"/>
-              </a:spcBef>
-              <a:spcAft>
-                <a:spcPts val="0"/>
-              </a:spcAft>
-              <a:buNone/>
-            </a:pPr>
-            <a:fld id="{00000000-1234-1234-1234-123412341234}" type="slidenum">
-              <a:rPr lang="en"/>
-              <a:t>‹#›</a:t>
-            </a:fld>
-            <a:endParaRPr/>
-          </a:p>
-          <a:p>
-            <a:pPr indent="0" lvl="0" marL="0" rtl="0" algn="r">
-              <a:spcBef>
-                <a:spcPts val="0"/>
-              </a:spcBef>
-              <a:spcAft>
-                <a:spcPts val="0"/>
-              </a:spcAft>
-              <a:buNone/>
-            </a:pPr>
-            <a:r>
-              <a:rPr b="0" lang="en" sz="900" u="sng">
-                <a:solidFill>
-                  <a:schemeClr val="hlink"/>
-                </a:solidFill>
-                <a:hlinkClick r:id="rId2"/>
-              </a:rPr>
-              <a:t>https://profriehle.com</a:t>
-            </a:r>
-            <a:r>
-              <a:rPr b="0" lang="en" sz="900">
-                <a:solidFill>
-                  <a:schemeClr val="dk2"/>
-                </a:solidFill>
-              </a:rPr>
-              <a:t> </a:t>
-            </a:r>
-            <a:endParaRPr>
-              <a:solidFill>
-                <a:schemeClr val="dk2"/>
-              </a:solidFill>
-            </a:endParaRPr>
-          </a:p>
         </p:txBody>
       </p:sp>
       <p:sp>
@@ -4618,6 +4594,144 @@
           </a:p>
         </p:txBody>
       </p:sp>
+      <p:sp>
+        <p:nvSpPr>
+          <p:cNvPr id="31" name="Google Shape;31;p6"/>
+          <p:cNvSpPr txBox="1"/>
+          <p:nvPr>
+            <p:ph idx="12" type="sldNum"/>
+          </p:nvPr>
+        </p:nvSpPr>
+        <p:spPr>
+          <a:xfrm>
+            <a:off x="7315209" y="4229101"/>
+            <a:ext cx="1828800" cy="914400"/>
+          </a:xfrm>
+          <a:prstGeom prst="rect">
+            <a:avLst/>
+          </a:prstGeom>
+        </p:spPr>
+        <p:txBody>
+          <a:bodyPr anchorCtr="0" anchor="b" bIns="91425" lIns="91425" spcFirstLastPara="1" rIns="91425" wrap="square" tIns="91425">
+            <a:noAutofit/>
+          </a:bodyPr>
+          <a:lstStyle>
+            <a:lvl1pPr lvl="0" rtl="0" algn="r">
+              <a:buNone/>
+              <a:defRPr b="1" sz="2400">
+                <a:solidFill>
+                  <a:schemeClr val="dk1"/>
+                </a:solidFill>
+              </a:defRPr>
+            </a:lvl1pPr>
+            <a:lvl2pPr lvl="1" rtl="0" algn="r">
+              <a:buNone/>
+              <a:defRPr b="1" sz="2400">
+                <a:solidFill>
+                  <a:schemeClr val="dk1"/>
+                </a:solidFill>
+              </a:defRPr>
+            </a:lvl2pPr>
+            <a:lvl3pPr lvl="2" rtl="0" algn="r">
+              <a:buNone/>
+              <a:defRPr b="1" sz="2400">
+                <a:solidFill>
+                  <a:schemeClr val="dk1"/>
+                </a:solidFill>
+              </a:defRPr>
+            </a:lvl3pPr>
+            <a:lvl4pPr lvl="3" rtl="0" algn="r">
+              <a:buNone/>
+              <a:defRPr b="1" sz="2400">
+                <a:solidFill>
+                  <a:schemeClr val="dk1"/>
+                </a:solidFill>
+              </a:defRPr>
+            </a:lvl4pPr>
+            <a:lvl5pPr lvl="4" rtl="0" algn="r">
+              <a:buNone/>
+              <a:defRPr b="1" sz="2400">
+                <a:solidFill>
+                  <a:schemeClr val="dk1"/>
+                </a:solidFill>
+              </a:defRPr>
+            </a:lvl5pPr>
+            <a:lvl6pPr lvl="5" rtl="0" algn="r">
+              <a:buNone/>
+              <a:defRPr b="1" sz="2400">
+                <a:solidFill>
+                  <a:schemeClr val="dk1"/>
+                </a:solidFill>
+              </a:defRPr>
+            </a:lvl6pPr>
+            <a:lvl7pPr lvl="6" rtl="0" algn="r">
+              <a:buNone/>
+              <a:defRPr b="1" sz="2400">
+                <a:solidFill>
+                  <a:schemeClr val="dk1"/>
+                </a:solidFill>
+              </a:defRPr>
+            </a:lvl7pPr>
+            <a:lvl8pPr lvl="7" rtl="0" algn="r">
+              <a:buNone/>
+              <a:defRPr b="1" sz="2400">
+                <a:solidFill>
+                  <a:schemeClr val="dk1"/>
+                </a:solidFill>
+              </a:defRPr>
+            </a:lvl8pPr>
+            <a:lvl9pPr lvl="8" rtl="0" algn="r">
+              <a:buNone/>
+              <a:defRPr b="1" sz="2400">
+                <a:solidFill>
+                  <a:schemeClr val="dk1"/>
+                </a:solidFill>
+              </a:defRPr>
+            </a:lvl9pPr>
+          </a:lstStyle>
+          <a:p>
+            <a:pPr indent="0" lvl="0" marL="0" rtl="0" algn="r">
+              <a:spcBef>
+                <a:spcPts val="0"/>
+              </a:spcBef>
+              <a:spcAft>
+                <a:spcPts val="0"/>
+              </a:spcAft>
+              <a:buNone/>
+            </a:pPr>
+            <a:fld id="{00000000-1234-1234-1234-123412341234}" type="slidenum">
+              <a:rPr lang="en"/>
+              <a:t>‹#›</a:t>
+            </a:fld>
+            <a:endParaRPr/>
+          </a:p>
+          <a:p>
+            <a:pPr indent="0" lvl="0" marL="0" rtl="0" algn="r">
+              <a:spcBef>
+                <a:spcPts val="0"/>
+              </a:spcBef>
+              <a:spcAft>
+                <a:spcPts val="0"/>
+              </a:spcAft>
+              <a:buNone/>
+            </a:pPr>
+            <a:r>
+              <a:rPr b="0" lang="en" sz="1000" u="sng">
+                <a:solidFill>
+                  <a:schemeClr val="hlink"/>
+                </a:solidFill>
+                <a:hlinkClick r:id="rId2"/>
+              </a:rPr>
+              <a:t>uni1.de/nyt</a:t>
+            </a:r>
+            <a:r>
+              <a:rPr b="0" lang="en" sz="1000"/>
+              <a:t> </a:t>
+            </a:r>
+            <a:endParaRPr b="0" sz="1000"/>
+          </a:p>
+        </p:txBody>
+      </p:sp>
     </p:spTree>
   </p:cSld>
   <p:clrMapOvr>
@@ -4631,7 +4745,7 @@
   <p:cSld name="BLANK">
     <p:spTree>
       <p:nvGrpSpPr>
-        <p:cNvPr id="31" name="Shape 31"/>
+        <p:cNvPr id="32" name="Shape 32"/>
         <p:cNvGrpSpPr/>
         <p:nvPr/>
       </p:nvGrpSpPr>
@@ -5096,8 +5210,8 @@
         </p:nvSpPr>
         <p:spPr>
           <a:xfrm>
-            <a:off x="7315202" y="4416550"/>
-            <a:ext cx="1828800" cy="731400"/>
+            <a:off x="7315209" y="4229101"/>
+            <a:ext cx="1828800" cy="914400"/>
           </a:xfrm>
           <a:prstGeom prst="rect">
             <a:avLst/>
@@ -5116,7 +5230,7 @@
               <a:buNone/>
               <a:defRPr b="1" sz="2400">
                 <a:solidFill>
-                  <a:schemeClr val="dk2"/>
+                  <a:schemeClr val="dk1"/>
                 </a:solidFill>
               </a:defRPr>
             </a:lvl1pPr>
@@ -5124,7 +5238,7 @@
               <a:buNone/>
               <a:defRPr b="1" sz="2400">
                 <a:solidFill>
-                  <a:schemeClr val="dk2"/>
+                  <a:schemeClr val="dk1"/>
                 </a:solidFill>
               </a:defRPr>
             </a:lvl2pPr>
@@ -5132,7 +5246,7 @@
               <a:buNone/>
               <a:defRPr b="1" sz="2400">
                 <a:solidFill>
-                  <a:schemeClr val="dk2"/>
+                  <a:schemeClr val="dk1"/>
                 </a:solidFill>
               </a:defRPr>
             </a:lvl3pPr>
@@ -5140,7 +5254,7 @@
               <a:buNone/>
               <a:defRPr b="1" sz="2400">
                 <a:solidFill>
-                  <a:schemeClr val="dk2"/>
+                  <a:schemeClr val="dk1"/>
                 </a:solidFill>
               </a:defRPr>
             </a:lvl4pPr>
@@ -5148,7 +5262,7 @@
               <a:buNone/>
               <a:defRPr b="1" sz="2400">
                 <a:solidFill>
-                  <a:schemeClr val="dk2"/>
+                  <a:schemeClr val="dk1"/>
                 </a:solidFill>
               </a:defRPr>
             </a:lvl5pPr>
@@ -5156,7 +5270,7 @@
               <a:buNone/>
               <a:defRPr b="1" sz="2400">
                 <a:solidFill>
-                  <a:schemeClr val="dk2"/>
+                  <a:schemeClr val="dk1"/>
                 </a:solidFill>
               </a:defRPr>
             </a:lvl6pPr>
@@ -5164,7 +5278,7 @@
               <a:buNone/>
               <a:defRPr b="1" sz="2400">
                 <a:solidFill>
-                  <a:schemeClr val="dk2"/>
+                  <a:schemeClr val="dk1"/>
                 </a:solidFill>
               </a:defRPr>
             </a:lvl7pPr>
@@ -5172,7 +5286,7 @@
               <a:buNone/>
               <a:defRPr b="1" sz="2400">
                 <a:solidFill>
-                  <a:schemeClr val="dk2"/>
+                  <a:schemeClr val="dk1"/>
                 </a:solidFill>
               </a:defRPr>
             </a:lvl8pPr>
@@ -5180,7 +5294,7 @@
               <a:buNone/>
               <a:defRPr b="1" sz="2400">
                 <a:solidFill>
-                  <a:schemeClr val="dk2"/>
+                  <a:schemeClr val="dk1"/>
                 </a:solidFill>
               </a:defRPr>
             </a:lvl9pPr>
@@ -5212,19 +5326,19 @@
               <a:buNone/>
             </a:pPr>
             <a:r>
-              <a:rPr b="0" lang="en" sz="900" u="sng">
+              <a:rPr b="0" lang="en" sz="1000" u="sng">
                 <a:solidFill>
                   <a:schemeClr val="hlink"/>
                 </a:solidFill>
                 <a:hlinkClick r:id="rId1"/>
               </a:rPr>
-              <a:t>https://profriehle.com</a:t>
-            </a:r>
-            <a:r>
-              <a:rPr b="0" lang="en" sz="900"/>
+              <a:t>uni1.de/nyt</a:t>
+            </a:r>
+            <a:r>
+              <a:rPr b="0" lang="en" sz="1000"/>
               <a:t> </a:t>
             </a:r>
-            <a:endParaRPr b="0" sz="900"/>
+            <a:endParaRPr b="0" sz="1000"/>
           </a:p>
         </p:txBody>
       </p:sp>
@@ -5937,7 +6051,7 @@
   <p:cSld>
     <p:spTree>
       <p:nvGrpSpPr>
-        <p:cNvPr id="35" name="Shape 35"/>
+        <p:cNvPr id="36" name="Shape 36"/>
         <p:cNvGrpSpPr/>
         <p:nvPr/>
       </p:nvGrpSpPr>
@@ -5951,7 +6065,7 @@
       </p:grpSpPr>
       <p:sp>
         <p:nvSpPr>
-          <p:cNvPr id="36" name="Google Shape;36;p8"/>
+          <p:cNvPr id="37" name="Google Shape;37;p8"/>
           <p:cNvSpPr txBox="1"/>
           <p:nvPr>
             <p:ph type="ctrTitle"/>
@@ -5991,7 +6105,7 @@
       </p:sp>
       <p:sp>
         <p:nvSpPr>
-          <p:cNvPr id="37" name="Google Shape;37;p8"/>
+          <p:cNvPr id="38" name="Google Shape;38;p8"/>
           <p:cNvSpPr txBox="1"/>
           <p:nvPr>
             <p:ph idx="1" type="subTitle"/>
@@ -6098,7 +6212,7 @@
   <p:cSld>
     <p:spTree>
       <p:nvGrpSpPr>
-        <p:cNvPr id="93" name="Shape 93"/>
+        <p:cNvPr id="94" name="Shape 94"/>
         <p:cNvGrpSpPr/>
         <p:nvPr/>
       </p:nvGrpSpPr>
@@ -6112,7 +6226,7 @@
       </p:grpSpPr>
       <p:sp>
         <p:nvSpPr>
-          <p:cNvPr id="94" name="Google Shape;94;p17"/>
+          <p:cNvPr id="95" name="Google Shape;95;p17"/>
           <p:cNvSpPr txBox="1"/>
           <p:nvPr>
             <p:ph type="title"/>
@@ -6152,7 +6266,7 @@
       </p:sp>
       <p:sp>
         <p:nvSpPr>
-          <p:cNvPr id="95" name="Google Shape;95;p17"/>
+          <p:cNvPr id="96" name="Google Shape;96;p17"/>
           <p:cNvSpPr txBox="1"/>
           <p:nvPr>
             <p:ph idx="12" type="sldNum"/>
@@ -6160,8 +6274,8 @@
         </p:nvSpPr>
         <p:spPr>
           <a:xfrm>
-            <a:off x="7315202" y="4416550"/>
-            <a:ext cx="1828800" cy="731400"/>
+            <a:off x="7315209" y="4229101"/>
+            <a:ext cx="1828800" cy="914400"/>
           </a:xfrm>
           <a:prstGeom prst="rect">
             <a:avLst/>
@@ -6199,33 +6313,25 @@
               <a:buNone/>
             </a:pPr>
             <a:r>
-              <a:rPr b="0" lang="en" sz="900" u="sng">
+              <a:rPr b="0" lang="en" sz="1000" u="sng">
                 <a:solidFill>
                   <a:schemeClr val="hlink"/>
                 </a:solidFill>
                 <a:hlinkClick r:id="rId3"/>
               </a:rPr>
-              <a:t>https://profriehle.com</a:t>
-            </a:r>
-            <a:r>
-              <a:rPr b="0" lang="en" sz="900">
-                <a:solidFill>
-                  <a:schemeClr val="dk2"/>
-                </a:solidFill>
-              </a:rPr>
+              <a:t>uni1.de/nyt</a:t>
+            </a:r>
+            <a:r>
+              <a:rPr b="0" lang="en" sz="1000"/>
               <a:t> </a:t>
             </a:r>
-            <a:endParaRPr b="0" sz="900">
-              <a:solidFill>
-                <a:schemeClr val="dk2"/>
-              </a:solidFill>
-            </a:endParaRPr>
+            <a:endParaRPr b="0" sz="1000"/>
           </a:p>
         </p:txBody>
       </p:sp>
       <p:sp>
         <p:nvSpPr>
-          <p:cNvPr id="96" name="Google Shape;96;p17"/>
+          <p:cNvPr id="97" name="Google Shape;97;p17"/>
           <p:cNvSpPr txBox="1"/>
           <p:nvPr>
             <p:ph idx="1" type="body"/>
@@ -7065,7 +7171,7 @@
   <p:cSld>
     <p:spTree>
       <p:nvGrpSpPr>
-        <p:cNvPr id="100" name="Shape 100"/>
+        <p:cNvPr id="101" name="Shape 101"/>
         <p:cNvGrpSpPr/>
         <p:nvPr/>
       </p:nvGrpSpPr>
@@ -7079,7 +7185,7 @@
       </p:grpSpPr>
       <p:sp>
         <p:nvSpPr>
-          <p:cNvPr id="101" name="Google Shape;101;p18"/>
+          <p:cNvPr id="102" name="Google Shape;102;p18"/>
           <p:cNvSpPr txBox="1"/>
           <p:nvPr>
             <p:ph type="title"/>
@@ -7130,7 +7236,7 @@
   <p:cSld>
     <p:spTree>
       <p:nvGrpSpPr>
-        <p:cNvPr id="105" name="Shape 105"/>
+        <p:cNvPr id="106" name="Shape 106"/>
         <p:cNvGrpSpPr/>
         <p:nvPr/>
       </p:nvGrpSpPr>
@@ -7144,7 +7250,7 @@
       </p:grpSpPr>
       <p:sp>
         <p:nvSpPr>
-          <p:cNvPr id="106" name="Google Shape;106;p19"/>
+          <p:cNvPr id="107" name="Google Shape;107;p19"/>
           <p:cNvSpPr txBox="1"/>
           <p:nvPr>
             <p:ph type="title"/>
@@ -7188,7 +7294,7 @@
       </p:sp>
       <p:sp>
         <p:nvSpPr>
-          <p:cNvPr id="107" name="Google Shape;107;p19"/>
+          <p:cNvPr id="108" name="Google Shape;108;p19"/>
           <p:cNvSpPr txBox="1"/>
           <p:nvPr>
             <p:ph idx="1" type="body"/>
@@ -7380,7 +7486,7 @@
       </p:sp>
       <p:sp>
         <p:nvSpPr>
-          <p:cNvPr id="108" name="Google Shape;108;p19"/>
+          <p:cNvPr id="109" name="Google Shape;109;p19"/>
           <p:cNvSpPr txBox="1"/>
           <p:nvPr>
             <p:ph idx="12" type="sldNum"/>
@@ -7388,8 +7494,8 @@
         </p:nvSpPr>
         <p:spPr>
           <a:xfrm>
-            <a:off x="7315202" y="4416550"/>
-            <a:ext cx="1828800" cy="731400"/>
+            <a:off x="7315209" y="4229101"/>
+            <a:ext cx="1828800" cy="914400"/>
           </a:xfrm>
           <a:prstGeom prst="rect">
             <a:avLst/>
@@ -7427,27 +7533,19 @@
               <a:buNone/>
             </a:pPr>
             <a:r>
-              <a:rPr b="0" lang="en" sz="900" u="sng">
+              <a:rPr b="0" lang="en" sz="1000" u="sng">
                 <a:solidFill>
                   <a:schemeClr val="hlink"/>
                 </a:solidFill>
                 <a:hlinkClick r:id="rId3"/>
               </a:rPr>
-              <a:t>https://profriehle.com</a:t>
-            </a:r>
-            <a:r>
-              <a:rPr b="0" lang="en" sz="900">
-                <a:solidFill>
-                  <a:schemeClr val="dk2"/>
-                </a:solidFill>
-              </a:rPr>
+              <a:t>uni1.de/nyt</a:t>
+            </a:r>
+            <a:r>
+              <a:rPr b="0" lang="en" sz="1000"/>
               <a:t> </a:t>
             </a:r>
-            <a:endParaRPr b="0" sz="900">
-              <a:solidFill>
-                <a:schemeClr val="dk2"/>
-              </a:solidFill>
-            </a:endParaRPr>
+            <a:endParaRPr b="0" sz="1000"/>
           </a:p>
         </p:txBody>
       </p:sp>
@@ -7464,7 +7562,7 @@
   <p:cSld>
     <p:spTree>
       <p:nvGrpSpPr>
-        <p:cNvPr id="112" name="Shape 112"/>
+        <p:cNvPr id="113" name="Shape 113"/>
         <p:cNvGrpSpPr/>
         <p:nvPr/>
       </p:nvGrpSpPr>
@@ -7478,7 +7576,7 @@
       </p:grpSpPr>
       <p:sp>
         <p:nvSpPr>
-          <p:cNvPr id="113" name="Google Shape;113;p20"/>
+          <p:cNvPr id="114" name="Google Shape;114;p20"/>
           <p:cNvSpPr txBox="1"/>
           <p:nvPr>
             <p:ph type="title"/>
@@ -7518,7 +7616,7 @@
       </p:sp>
       <p:sp>
         <p:nvSpPr>
-          <p:cNvPr id="114" name="Google Shape;114;p20"/>
+          <p:cNvPr id="115" name="Google Shape;115;p20"/>
           <p:cNvSpPr txBox="1"/>
           <p:nvPr>
             <p:ph idx="12" type="sldNum"/>
@@ -7526,8 +7624,8 @@
         </p:nvSpPr>
         <p:spPr>
           <a:xfrm>
-            <a:off x="7315202" y="4416550"/>
-            <a:ext cx="1828800" cy="731400"/>
+            <a:off x="7315209" y="4229101"/>
+            <a:ext cx="1828800" cy="914400"/>
           </a:xfrm>
           <a:prstGeom prst="rect">
             <a:avLst/>
@@ -7565,33 +7663,25 @@
               <a:buNone/>
             </a:pPr>
             <a:r>
-              <a:rPr b="0" lang="en" sz="900" u="sng">
+              <a:rPr b="0" lang="en" sz="1000" u="sng">
                 <a:solidFill>
                   <a:schemeClr val="hlink"/>
                 </a:solidFill>
                 <a:hlinkClick r:id="rId3"/>
               </a:rPr>
-              <a:t>https://profriehle.com</a:t>
-            </a:r>
-            <a:r>
-              <a:rPr b="0" lang="en" sz="900">
-                <a:solidFill>
-                  <a:schemeClr val="dk2"/>
-                </a:solidFill>
-              </a:rPr>
+              <a:t>uni1.de/nyt</a:t>
+            </a:r>
+            <a:r>
+              <a:rPr b="0" lang="en" sz="1000"/>
               <a:t> </a:t>
             </a:r>
-            <a:endParaRPr b="0" sz="900">
-              <a:solidFill>
-                <a:schemeClr val="dk2"/>
-              </a:solidFill>
-            </a:endParaRPr>
+            <a:endParaRPr b="0" sz="1000"/>
           </a:p>
         </p:txBody>
       </p:sp>
       <p:sp>
         <p:nvSpPr>
-          <p:cNvPr id="115" name="Google Shape;115;p20"/>
+          <p:cNvPr id="116" name="Google Shape;116;p20"/>
           <p:cNvSpPr txBox="1"/>
           <p:nvPr>
             <p:ph idx="1" type="body"/>
@@ -7773,7 +7863,7 @@
   <p:cSld>
     <p:spTree>
       <p:nvGrpSpPr>
-        <p:cNvPr id="119" name="Shape 119"/>
+        <p:cNvPr id="120" name="Shape 120"/>
         <p:cNvGrpSpPr/>
         <p:nvPr/>
       </p:nvGrpSpPr>
@@ -7787,7 +7877,7 @@
       </p:grpSpPr>
       <p:sp>
         <p:nvSpPr>
-          <p:cNvPr id="120" name="Google Shape;120;p21"/>
+          <p:cNvPr id="121" name="Google Shape;121;p21"/>
           <p:cNvSpPr txBox="1"/>
           <p:nvPr>
             <p:ph type="title"/>
@@ -7827,7 +7917,7 @@
       </p:sp>
       <p:sp>
         <p:nvSpPr>
-          <p:cNvPr id="121" name="Google Shape;121;p21"/>
+          <p:cNvPr id="122" name="Google Shape;122;p21"/>
           <p:cNvSpPr txBox="1"/>
           <p:nvPr>
             <p:ph idx="12" type="sldNum"/>
@@ -7835,8 +7925,8 @@
         </p:nvSpPr>
         <p:spPr>
           <a:xfrm>
-            <a:off x="7315202" y="4416550"/>
-            <a:ext cx="1828800" cy="731400"/>
+            <a:off x="7315209" y="4229101"/>
+            <a:ext cx="1828800" cy="914400"/>
           </a:xfrm>
           <a:prstGeom prst="rect">
             <a:avLst/>
@@ -7874,33 +7964,25 @@
               <a:buNone/>
             </a:pPr>
             <a:r>
-              <a:rPr b="0" lang="en" sz="900" u="sng">
+              <a:rPr b="0" lang="en" sz="1000" u="sng">
                 <a:solidFill>
                   <a:schemeClr val="hlink"/>
                 </a:solidFill>
                 <a:hlinkClick r:id="rId3"/>
               </a:rPr>
-              <a:t>https://profriehle.com</a:t>
-            </a:r>
-            <a:r>
-              <a:rPr b="0" lang="en" sz="900">
-                <a:solidFill>
-                  <a:schemeClr val="dk2"/>
-                </a:solidFill>
-              </a:rPr>
+              <a:t>uni1.de/nyt</a:t>
+            </a:r>
+            <a:r>
+              <a:rPr b="0" lang="en" sz="1000"/>
               <a:t> </a:t>
             </a:r>
-            <a:endParaRPr b="0" sz="900">
-              <a:solidFill>
-                <a:schemeClr val="dk2"/>
-              </a:solidFill>
-            </a:endParaRPr>
+            <a:endParaRPr b="0" sz="1000"/>
           </a:p>
         </p:txBody>
       </p:sp>
       <p:sp>
         <p:nvSpPr>
-          <p:cNvPr id="122" name="Google Shape;122;p21"/>
+          <p:cNvPr id="123" name="Google Shape;123;p21"/>
           <p:cNvSpPr txBox="1"/>
           <p:nvPr>
             <p:ph idx="1" type="body"/>
@@ -8052,7 +8134,7 @@
   <p:cSld>
     <p:spTree>
       <p:nvGrpSpPr>
-        <p:cNvPr id="126" name="Shape 126"/>
+        <p:cNvPr id="127" name="Shape 127"/>
         <p:cNvGrpSpPr/>
         <p:nvPr/>
       </p:nvGrpSpPr>
@@ -8066,7 +8148,7 @@
       </p:grpSpPr>
       <p:sp>
         <p:nvSpPr>
-          <p:cNvPr id="127" name="Google Shape;127;p22"/>
+          <p:cNvPr id="128" name="Google Shape;128;p22"/>
           <p:cNvSpPr txBox="1"/>
           <p:nvPr>
             <p:ph type="title"/>
@@ -8106,7 +8188,7 @@
       </p:sp>
       <p:sp>
         <p:nvSpPr>
-          <p:cNvPr id="128" name="Google Shape;128;p22"/>
+          <p:cNvPr id="129" name="Google Shape;129;p22"/>
           <p:cNvSpPr txBox="1"/>
           <p:nvPr>
             <p:ph idx="1" type="body"/>
@@ -8164,7 +8246,7 @@
       </p:sp>
       <p:sp>
         <p:nvSpPr>
-          <p:cNvPr id="129" name="Google Shape;129;p22"/>
+          <p:cNvPr id="130" name="Google Shape;130;p22"/>
           <p:cNvSpPr txBox="1"/>
           <p:nvPr>
             <p:ph idx="12" type="sldNum"/>
@@ -8172,8 +8254,8 @@
         </p:nvSpPr>
         <p:spPr>
           <a:xfrm>
-            <a:off x="7315202" y="4416550"/>
-            <a:ext cx="1828800" cy="731400"/>
+            <a:off x="7315209" y="4229101"/>
+            <a:ext cx="1828800" cy="914400"/>
           </a:xfrm>
           <a:prstGeom prst="rect">
             <a:avLst/>
@@ -8211,27 +8293,19 @@
               <a:buNone/>
             </a:pPr>
             <a:r>
-              <a:rPr b="0" lang="en" sz="900" u="sng">
+              <a:rPr b="0" lang="en" sz="1000" u="sng">
                 <a:solidFill>
                   <a:schemeClr val="hlink"/>
                 </a:solidFill>
                 <a:hlinkClick r:id="rId3"/>
               </a:rPr>
-              <a:t>https://profriehle.com</a:t>
-            </a:r>
-            <a:r>
-              <a:rPr b="0" lang="en" sz="900">
-                <a:solidFill>
-                  <a:schemeClr val="dk2"/>
-                </a:solidFill>
-              </a:rPr>
+              <a:t>uni1.de/nyt</a:t>
+            </a:r>
+            <a:r>
+              <a:rPr b="0" lang="en" sz="1000"/>
               <a:t> </a:t>
             </a:r>
-            <a:endParaRPr b="0" sz="900">
-              <a:solidFill>
-                <a:schemeClr val="dk2"/>
-              </a:solidFill>
-            </a:endParaRPr>
+            <a:endParaRPr b="0" sz="1000"/>
           </a:p>
         </p:txBody>
       </p:sp>
@@ -8248,7 +8322,7 @@
   <p:cSld>
     <p:spTree>
       <p:nvGrpSpPr>
-        <p:cNvPr id="133" name="Shape 133"/>
+        <p:cNvPr id="134" name="Shape 134"/>
         <p:cNvGrpSpPr/>
         <p:nvPr/>
       </p:nvGrpSpPr>
@@ -8262,7 +8336,7 @@
       </p:grpSpPr>
       <p:sp>
         <p:nvSpPr>
-          <p:cNvPr id="134" name="Google Shape;134;p23"/>
+          <p:cNvPr id="135" name="Google Shape;135;p23"/>
           <p:cNvSpPr txBox="1"/>
           <p:nvPr>
             <p:ph type="title"/>
@@ -8302,7 +8376,7 @@
       </p:sp>
       <p:sp>
         <p:nvSpPr>
-          <p:cNvPr id="135" name="Google Shape;135;p23"/>
+          <p:cNvPr id="136" name="Google Shape;136;p23"/>
           <p:cNvSpPr txBox="1"/>
           <p:nvPr>
             <p:ph idx="12" type="sldNum"/>
@@ -8310,8 +8384,8 @@
         </p:nvSpPr>
         <p:spPr>
           <a:xfrm>
-            <a:off x="7315202" y="4416550"/>
-            <a:ext cx="1828800" cy="731400"/>
+            <a:off x="7315209" y="4229101"/>
+            <a:ext cx="1828800" cy="914400"/>
           </a:xfrm>
           <a:prstGeom prst="rect">
             <a:avLst/>
@@ -8349,33 +8423,25 @@
               <a:buNone/>
             </a:pPr>
             <a:r>
-              <a:rPr b="0" lang="en" sz="900" u="sng">
+              <a:rPr b="0" lang="en" sz="1000" u="sng">
                 <a:solidFill>
                   <a:schemeClr val="hlink"/>
                 </a:solidFill>
                 <a:hlinkClick r:id="rId3"/>
               </a:rPr>
-              <a:t>https://profriehle.com</a:t>
-            </a:r>
-            <a:r>
-              <a:rPr b="0" lang="en" sz="900">
-                <a:solidFill>
-                  <a:schemeClr val="dk2"/>
-                </a:solidFill>
-              </a:rPr>
+              <a:t>uni1.de/nyt</a:t>
+            </a:r>
+            <a:r>
+              <a:rPr b="0" lang="en" sz="1000"/>
               <a:t> </a:t>
             </a:r>
-            <a:endParaRPr b="0" sz="900">
-              <a:solidFill>
-                <a:schemeClr val="dk2"/>
-              </a:solidFill>
-            </a:endParaRPr>
+            <a:endParaRPr b="0" sz="1000"/>
           </a:p>
         </p:txBody>
       </p:sp>
       <p:sp>
         <p:nvSpPr>
-          <p:cNvPr id="136" name="Google Shape;136;p23"/>
+          <p:cNvPr id="137" name="Google Shape;137;p23"/>
           <p:cNvSpPr txBox="1"/>
           <p:nvPr>
             <p:ph idx="1" type="body"/>
@@ -8525,7 +8591,7 @@
   <p:cSld>
     <p:spTree>
       <p:nvGrpSpPr>
-        <p:cNvPr id="140" name="Shape 140"/>
+        <p:cNvPr id="141" name="Shape 141"/>
         <p:cNvGrpSpPr/>
         <p:nvPr/>
       </p:nvGrpSpPr>
@@ -8539,7 +8605,7 @@
       </p:grpSpPr>
       <p:sp>
         <p:nvSpPr>
-          <p:cNvPr id="141" name="Google Shape;141;p24"/>
+          <p:cNvPr id="142" name="Google Shape;142;p24"/>
           <p:cNvSpPr txBox="1"/>
           <p:nvPr>
             <p:ph type="title"/>
@@ -8579,7 +8645,7 @@
       </p:sp>
       <p:sp>
         <p:nvSpPr>
-          <p:cNvPr id="142" name="Google Shape;142;p24"/>
+          <p:cNvPr id="143" name="Google Shape;143;p24"/>
           <p:cNvSpPr txBox="1"/>
           <p:nvPr>
             <p:ph idx="12" type="sldNum"/>
@@ -8587,8 +8653,8 @@
         </p:nvSpPr>
         <p:spPr>
           <a:xfrm>
-            <a:off x="7315202" y="4416550"/>
-            <a:ext cx="1828800" cy="731400"/>
+            <a:off x="7315209" y="4229101"/>
+            <a:ext cx="1828800" cy="914400"/>
           </a:xfrm>
           <a:prstGeom prst="rect">
             <a:avLst/>
@@ -8626,33 +8692,25 @@
               <a:buNone/>
             </a:pPr>
             <a:r>
-              <a:rPr b="0" lang="en" sz="900" u="sng">
+              <a:rPr b="0" lang="en" sz="1000" u="sng">
                 <a:solidFill>
                   <a:schemeClr val="hlink"/>
                 </a:solidFill>
                 <a:hlinkClick r:id="rId3"/>
               </a:rPr>
-              <a:t>https://profriehle.com</a:t>
-            </a:r>
-            <a:r>
-              <a:rPr b="0" lang="en" sz="900">
-                <a:solidFill>
-                  <a:schemeClr val="dk2"/>
-                </a:solidFill>
-              </a:rPr>
+              <a:t>uni1.de/nyt</a:t>
+            </a:r>
+            <a:r>
+              <a:rPr b="0" lang="en" sz="1000"/>
               <a:t> </a:t>
             </a:r>
-            <a:endParaRPr>
-              <a:solidFill>
-                <a:schemeClr val="dk2"/>
-              </a:solidFill>
-            </a:endParaRPr>
+            <a:endParaRPr b="0" sz="1000"/>
           </a:p>
         </p:txBody>
       </p:sp>
       <p:pic>
         <p:nvPicPr>
-          <p:cNvPr id="143" name="Google Shape;143;p24"/>
+          <p:cNvPr id="144" name="Google Shape;144;p24"/>
           <p:cNvPicPr preferRelativeResize="0"/>
           <p:nvPr/>
         </p:nvPicPr>
@@ -8680,7 +8738,7 @@
       </p:pic>
       <p:sp>
         <p:nvSpPr>
-          <p:cNvPr id="144" name="Google Shape;144;p24"/>
+          <p:cNvPr id="145" name="Google Shape;145;p24"/>
           <p:cNvSpPr txBox="1"/>
           <p:nvPr/>
         </p:nvSpPr>
@@ -8746,7 +8804,7 @@
   <p:cSld>
     <p:spTree>
       <p:nvGrpSpPr>
-        <p:cNvPr id="148" name="Shape 148"/>
+        <p:cNvPr id="149" name="Shape 149"/>
         <p:cNvGrpSpPr/>
         <p:nvPr/>
       </p:nvGrpSpPr>
@@ -8760,7 +8818,7 @@
       </p:grpSpPr>
       <p:sp>
         <p:nvSpPr>
-          <p:cNvPr id="149" name="Google Shape;149;p25"/>
+          <p:cNvPr id="150" name="Google Shape;150;p25"/>
           <p:cNvSpPr txBox="1"/>
           <p:nvPr>
             <p:ph type="title"/>
@@ -8800,7 +8858,7 @@
       </p:sp>
       <p:sp>
         <p:nvSpPr>
-          <p:cNvPr id="150" name="Google Shape;150;p25"/>
+          <p:cNvPr id="151" name="Google Shape;151;p25"/>
           <p:cNvSpPr txBox="1"/>
           <p:nvPr>
             <p:ph idx="1" type="body"/>
@@ -8890,7 +8948,7 @@
       </p:sp>
       <p:sp>
         <p:nvSpPr>
-          <p:cNvPr id="151" name="Google Shape;151;p25"/>
+          <p:cNvPr id="152" name="Google Shape;152;p25"/>
           <p:cNvSpPr txBox="1"/>
           <p:nvPr>
             <p:ph idx="12" type="sldNum"/>
@@ -8898,8 +8956,8 @@
         </p:nvSpPr>
         <p:spPr>
           <a:xfrm>
-            <a:off x="7315202" y="4416550"/>
-            <a:ext cx="1828800" cy="731400"/>
+            <a:off x="7315209" y="4229101"/>
+            <a:ext cx="1828800" cy="914400"/>
           </a:xfrm>
           <a:prstGeom prst="rect">
             <a:avLst/>
@@ -8937,27 +8995,19 @@
               <a:buNone/>
             </a:pPr>
             <a:r>
-              <a:rPr b="0" lang="en" sz="900" u="sng">
+              <a:rPr b="0" lang="en" sz="1000" u="sng">
                 <a:solidFill>
                   <a:schemeClr val="hlink"/>
                 </a:solidFill>
                 <a:hlinkClick r:id="rId3"/>
               </a:rPr>
-              <a:t>https://profriehle.com</a:t>
-            </a:r>
-            <a:r>
-              <a:rPr b="0" lang="en" sz="900">
-                <a:solidFill>
-                  <a:schemeClr val="dk2"/>
-                </a:solidFill>
-              </a:rPr>
+              <a:t>uni1.de/nyt</a:t>
+            </a:r>
+            <a:r>
+              <a:rPr b="0" lang="en" sz="1000"/>
               <a:t> </a:t>
             </a:r>
-            <a:endParaRPr b="0" sz="900">
-              <a:solidFill>
-                <a:schemeClr val="dk2"/>
-              </a:solidFill>
-            </a:endParaRPr>
+            <a:endParaRPr b="0" sz="1000"/>
           </a:p>
         </p:txBody>
       </p:sp>
@@ -8974,7 +9024,7 @@
   <p:cSld>
     <p:spTree>
       <p:nvGrpSpPr>
-        <p:cNvPr id="155" name="Shape 155"/>
+        <p:cNvPr id="156" name="Shape 156"/>
         <p:cNvGrpSpPr/>
         <p:nvPr/>
       </p:nvGrpSpPr>
@@ -8988,7 +9038,7 @@
       </p:grpSpPr>
       <p:sp>
         <p:nvSpPr>
-          <p:cNvPr id="156" name="Google Shape;156;p26"/>
+          <p:cNvPr id="157" name="Google Shape;157;p26"/>
           <p:cNvSpPr txBox="1"/>
           <p:nvPr>
             <p:ph type="ctrTitle"/>
@@ -9028,7 +9078,7 @@
       </p:sp>
       <p:sp>
         <p:nvSpPr>
-          <p:cNvPr id="157" name="Google Shape;157;p26"/>
+          <p:cNvPr id="158" name="Google Shape;158;p26"/>
           <p:cNvSpPr txBox="1"/>
           <p:nvPr>
             <p:ph idx="1" type="subTitle"/>
@@ -9158,7 +9208,7 @@
   <p:cSld>
     <p:spTree>
       <p:nvGrpSpPr>
-        <p:cNvPr id="41" name="Shape 41"/>
+        <p:cNvPr id="42" name="Shape 42"/>
         <p:cNvGrpSpPr/>
         <p:nvPr/>
       </p:nvGrpSpPr>
@@ -9172,7 +9222,7 @@
       </p:grpSpPr>
       <p:sp>
         <p:nvSpPr>
-          <p:cNvPr id="42" name="Google Shape;42;p9"/>
+          <p:cNvPr id="43" name="Google Shape;43;p9"/>
           <p:cNvSpPr txBox="1"/>
           <p:nvPr>
             <p:ph type="title"/>
@@ -9212,7 +9262,7 @@
       </p:sp>
       <p:sp>
         <p:nvSpPr>
-          <p:cNvPr id="43" name="Google Shape;43;p9"/>
+          <p:cNvPr id="44" name="Google Shape;44;p9"/>
           <p:cNvSpPr txBox="1"/>
           <p:nvPr>
             <p:ph idx="1" type="body"/>
@@ -9291,7 +9341,7 @@
       </p:sp>
       <p:sp>
         <p:nvSpPr>
-          <p:cNvPr id="44" name="Google Shape;44;p9"/>
+          <p:cNvPr id="45" name="Google Shape;45;p9"/>
           <p:cNvSpPr txBox="1"/>
           <p:nvPr>
             <p:ph idx="12" type="sldNum"/>
@@ -9299,8 +9349,8 @@
         </p:nvSpPr>
         <p:spPr>
           <a:xfrm>
-            <a:off x="7315202" y="4416550"/>
-            <a:ext cx="1828800" cy="731400"/>
+            <a:off x="7315209" y="4229101"/>
+            <a:ext cx="1828800" cy="914400"/>
           </a:xfrm>
           <a:prstGeom prst="rect">
             <a:avLst/>
@@ -9338,27 +9388,19 @@
               <a:buNone/>
             </a:pPr>
             <a:r>
-              <a:rPr b="0" lang="en" sz="900" u="sng">
+              <a:rPr b="0" lang="en" sz="1000" u="sng">
                 <a:solidFill>
                   <a:schemeClr val="hlink"/>
                 </a:solidFill>
                 <a:hlinkClick r:id="rId3"/>
               </a:rPr>
-              <a:t>https://profriehle.com</a:t>
-            </a:r>
-            <a:r>
-              <a:rPr b="0" lang="en" sz="900">
-                <a:solidFill>
-                  <a:schemeClr val="dk2"/>
-                </a:solidFill>
-              </a:rPr>
+              <a:t>uni1.de/nyt</a:t>
+            </a:r>
+            <a:r>
+              <a:rPr b="0" lang="en" sz="1000"/>
               <a:t> </a:t>
             </a:r>
-            <a:endParaRPr b="0" sz="900">
-              <a:solidFill>
-                <a:schemeClr val="dk2"/>
-              </a:solidFill>
-            </a:endParaRPr>
+            <a:endParaRPr b="0" sz="1000"/>
           </a:p>
         </p:txBody>
       </p:sp>
@@ -9375,7 +9417,7 @@
   <p:cSld>
     <p:spTree>
       <p:nvGrpSpPr>
-        <p:cNvPr id="161" name="Shape 161"/>
+        <p:cNvPr id="162" name="Shape 162"/>
         <p:cNvGrpSpPr/>
         <p:nvPr/>
       </p:nvGrpSpPr>
@@ -9389,7 +9431,7 @@
       </p:grpSpPr>
       <p:sp>
         <p:nvSpPr>
-          <p:cNvPr id="162" name="Google Shape;162;p27"/>
+          <p:cNvPr id="163" name="Google Shape;163;p27"/>
           <p:cNvSpPr txBox="1"/>
           <p:nvPr>
             <p:ph type="title"/>
@@ -9429,7 +9471,7 @@
       </p:sp>
       <p:sp>
         <p:nvSpPr>
-          <p:cNvPr id="163" name="Google Shape;163;p27"/>
+          <p:cNvPr id="164" name="Google Shape;164;p27"/>
           <p:cNvSpPr txBox="1"/>
           <p:nvPr>
             <p:ph idx="12" type="sldNum"/>
@@ -9437,8 +9479,8 @@
         </p:nvSpPr>
         <p:spPr>
           <a:xfrm>
-            <a:off x="7315202" y="4416550"/>
-            <a:ext cx="1828800" cy="731400"/>
+            <a:off x="7315209" y="4229101"/>
+            <a:ext cx="1828800" cy="914400"/>
           </a:xfrm>
           <a:prstGeom prst="rect">
             <a:avLst/>
@@ -9502,7 +9544,7 @@
       </p:sp>
       <p:sp>
         <p:nvSpPr>
-          <p:cNvPr id="164" name="Google Shape;164;p27"/>
+          <p:cNvPr id="165" name="Google Shape;165;p27"/>
           <p:cNvSpPr txBox="1"/>
           <p:nvPr>
             <p:ph idx="1" type="body"/>
@@ -9597,7 +9639,7 @@
             </a:pPr>
             <a:r>
               <a:rPr lang="en"/>
-              <a:t>© 2012, 2023 Dirk Riehle, some rights reserved</a:t>
+              <a:t>© 2012, 2023, 2024 Dirk Riehle, some rights reserved</a:t>
             </a:r>
             <a:endParaRPr/>
           </a:p>
@@ -9631,7 +9673,7 @@
   <p:cSld>
     <p:spTree>
       <p:nvGrpSpPr>
-        <p:cNvPr id="48" name="Shape 48"/>
+        <p:cNvPr id="49" name="Shape 49"/>
         <p:cNvGrpSpPr/>
         <p:nvPr/>
       </p:nvGrpSpPr>
@@ -9645,7 +9687,7 @@
       </p:grpSpPr>
       <p:sp>
         <p:nvSpPr>
-          <p:cNvPr id="49" name="Google Shape;49;p10"/>
+          <p:cNvPr id="50" name="Google Shape;50;p10"/>
           <p:cNvSpPr txBox="1"/>
           <p:nvPr>
             <p:ph type="title"/>
@@ -9696,7 +9738,7 @@
   <p:cSld>
     <p:spTree>
       <p:nvGrpSpPr>
-        <p:cNvPr id="53" name="Shape 53"/>
+        <p:cNvPr id="54" name="Shape 54"/>
         <p:cNvGrpSpPr/>
         <p:nvPr/>
       </p:nvGrpSpPr>
@@ -9710,7 +9752,7 @@
       </p:grpSpPr>
       <p:sp>
         <p:nvSpPr>
-          <p:cNvPr id="54" name="Google Shape;54;p11"/>
+          <p:cNvPr id="55" name="Google Shape;55;p11"/>
           <p:cNvSpPr txBox="1"/>
           <p:nvPr>
             <p:ph type="title"/>
@@ -9750,7 +9792,7 @@
       </p:sp>
       <p:sp>
         <p:nvSpPr>
-          <p:cNvPr id="55" name="Google Shape;55;p11"/>
+          <p:cNvPr id="56" name="Google Shape;56;p11"/>
           <p:cNvSpPr txBox="1"/>
           <p:nvPr>
             <p:ph idx="1" type="body"/>
@@ -9892,7 +9934,7 @@
       </p:sp>
       <p:sp>
         <p:nvSpPr>
-          <p:cNvPr id="56" name="Google Shape;56;p11"/>
+          <p:cNvPr id="57" name="Google Shape;57;p11"/>
           <p:cNvSpPr txBox="1"/>
           <p:nvPr>
             <p:ph idx="12" type="sldNum"/>
@@ -9900,8 +9942,8 @@
         </p:nvSpPr>
         <p:spPr>
           <a:xfrm>
-            <a:off x="7315202" y="4416550"/>
-            <a:ext cx="1828800" cy="731400"/>
+            <a:off x="7315209" y="4229101"/>
+            <a:ext cx="1828800" cy="914400"/>
           </a:xfrm>
           <a:prstGeom prst="rect">
             <a:avLst/>
@@ -9939,27 +9981,19 @@
               <a:buNone/>
             </a:pPr>
             <a:r>
-              <a:rPr b="0" lang="en" sz="900" u="sng">
+              <a:rPr b="0" lang="en" sz="1000" u="sng">
                 <a:solidFill>
                   <a:schemeClr val="hlink"/>
                 </a:solidFill>
                 <a:hlinkClick r:id="rId3"/>
               </a:rPr>
-              <a:t>https://profriehle.com</a:t>
-            </a:r>
-            <a:r>
-              <a:rPr b="0" lang="en" sz="900">
-                <a:solidFill>
-                  <a:schemeClr val="dk2"/>
-                </a:solidFill>
-              </a:rPr>
+              <a:t>uni1.de/nyt</a:t>
+            </a:r>
+            <a:r>
+              <a:rPr b="0" lang="en" sz="1000"/>
               <a:t> </a:t>
             </a:r>
-            <a:endParaRPr b="0" sz="900">
-              <a:solidFill>
-                <a:schemeClr val="dk2"/>
-              </a:solidFill>
-            </a:endParaRPr>
+            <a:endParaRPr b="0" sz="1000"/>
           </a:p>
         </p:txBody>
       </p:sp>
@@ -9976,7 +10010,7 @@
   <p:cSld>
     <p:spTree>
       <p:nvGrpSpPr>
-        <p:cNvPr id="60" name="Shape 60"/>
+        <p:cNvPr id="61" name="Shape 61"/>
         <p:cNvGrpSpPr/>
         <p:nvPr/>
       </p:nvGrpSpPr>
@@ -9990,7 +10024,7 @@
       </p:grpSpPr>
       <p:sp>
         <p:nvSpPr>
-          <p:cNvPr id="61" name="Google Shape;61;p12"/>
+          <p:cNvPr id="62" name="Google Shape;62;p12"/>
           <p:cNvSpPr txBox="1"/>
           <p:nvPr>
             <p:ph type="title"/>
@@ -10045,7 +10079,7 @@
   <p:cSld>
     <p:spTree>
       <p:nvGrpSpPr>
-        <p:cNvPr id="65" name="Shape 65"/>
+        <p:cNvPr id="66" name="Shape 66"/>
         <p:cNvGrpSpPr/>
         <p:nvPr/>
       </p:nvGrpSpPr>
@@ -10059,7 +10093,7 @@
       </p:grpSpPr>
       <p:sp>
         <p:nvSpPr>
-          <p:cNvPr id="66" name="Google Shape;66;p13"/>
+          <p:cNvPr id="67" name="Google Shape;67;p13"/>
           <p:cNvSpPr txBox="1"/>
           <p:nvPr>
             <p:ph type="title"/>
@@ -10099,7 +10133,7 @@
       </p:sp>
       <p:sp>
         <p:nvSpPr>
-          <p:cNvPr id="67" name="Google Shape;67;p13"/>
+          <p:cNvPr id="68" name="Google Shape;68;p13"/>
           <p:cNvSpPr txBox="1"/>
           <p:nvPr>
             <p:ph idx="1" type="body"/>
@@ -10243,7 +10277,7 @@
       </p:sp>
       <p:sp>
         <p:nvSpPr>
-          <p:cNvPr id="68" name="Google Shape;68;p13"/>
+          <p:cNvPr id="69" name="Google Shape;69;p13"/>
           <p:cNvSpPr txBox="1"/>
           <p:nvPr>
             <p:ph idx="12" type="sldNum"/>
@@ -10251,8 +10285,8 @@
         </p:nvSpPr>
         <p:spPr>
           <a:xfrm>
-            <a:off x="7315202" y="4416550"/>
-            <a:ext cx="1828800" cy="731400"/>
+            <a:off x="7315209" y="4229101"/>
+            <a:ext cx="1828800" cy="914400"/>
           </a:xfrm>
           <a:prstGeom prst="rect">
             <a:avLst/>
@@ -10290,27 +10324,19 @@
               <a:buNone/>
             </a:pPr>
             <a:r>
-              <a:rPr b="0" lang="en" sz="900" u="sng">
+              <a:rPr b="0" lang="en" sz="1000" u="sng">
                 <a:solidFill>
                   <a:schemeClr val="hlink"/>
                 </a:solidFill>
                 <a:hlinkClick r:id="rId3"/>
               </a:rPr>
-              <a:t>https://profriehle.com</a:t>
-            </a:r>
-            <a:r>
-              <a:rPr b="0" lang="en" sz="900">
-                <a:solidFill>
-                  <a:schemeClr val="dk2"/>
-                </a:solidFill>
-              </a:rPr>
+              <a:t>uni1.de/nyt</a:t>
+            </a:r>
+            <a:r>
+              <a:rPr b="0" lang="en" sz="1000"/>
               <a:t> </a:t>
             </a:r>
-            <a:endParaRPr b="0" sz="900">
-              <a:solidFill>
-                <a:schemeClr val="dk2"/>
-              </a:solidFill>
-            </a:endParaRPr>
+            <a:endParaRPr b="0" sz="1000"/>
           </a:p>
         </p:txBody>
       </p:sp>
@@ -10327,7 +10353,7 @@
   <p:cSld>
     <p:spTree>
       <p:nvGrpSpPr>
-        <p:cNvPr id="72" name="Shape 72"/>
+        <p:cNvPr id="73" name="Shape 73"/>
         <p:cNvGrpSpPr/>
         <p:nvPr/>
       </p:nvGrpSpPr>
@@ -10341,7 +10367,7 @@
       </p:grpSpPr>
       <p:pic>
         <p:nvPicPr>
-          <p:cNvPr id="73" name="Google Shape;73;p14"/>
+          <p:cNvPr id="74" name="Google Shape;74;p14"/>
           <p:cNvPicPr preferRelativeResize="0"/>
           <p:nvPr/>
         </p:nvPicPr>
@@ -10369,7 +10395,7 @@
       </p:pic>
       <p:sp>
         <p:nvSpPr>
-          <p:cNvPr id="74" name="Google Shape;74;p14"/>
+          <p:cNvPr id="75" name="Google Shape;75;p14"/>
           <p:cNvSpPr txBox="1"/>
           <p:nvPr>
             <p:ph type="title"/>
@@ -10409,7 +10435,7 @@
       </p:sp>
       <p:sp>
         <p:nvSpPr>
-          <p:cNvPr id="75" name="Google Shape;75;p14"/>
+          <p:cNvPr id="76" name="Google Shape;76;p14"/>
           <p:cNvSpPr txBox="1"/>
           <p:nvPr>
             <p:ph idx="12" type="sldNum"/>
@@ -10417,8 +10443,8 @@
         </p:nvSpPr>
         <p:spPr>
           <a:xfrm>
-            <a:off x="7315202" y="4416550"/>
-            <a:ext cx="1828800" cy="731400"/>
+            <a:off x="7315209" y="4229101"/>
+            <a:ext cx="1828800" cy="914400"/>
           </a:xfrm>
           <a:prstGeom prst="rect">
             <a:avLst/>
@@ -10456,27 +10482,19 @@
               <a:buNone/>
             </a:pPr>
             <a:r>
-              <a:rPr b="0" lang="en" sz="900" u="sng">
+              <a:rPr b="0" lang="en" sz="1000" u="sng">
                 <a:solidFill>
                   <a:schemeClr val="hlink"/>
                 </a:solidFill>
                 <a:hlinkClick r:id="rId4"/>
               </a:rPr>
-              <a:t>https://profriehle.com</a:t>
-            </a:r>
-            <a:r>
-              <a:rPr b="0" lang="en" sz="900">
-                <a:solidFill>
-                  <a:schemeClr val="dk2"/>
-                </a:solidFill>
-              </a:rPr>
+              <a:t>uni1.de/nyt</a:t>
+            </a:r>
+            <a:r>
+              <a:rPr b="0" lang="en" sz="1000"/>
               <a:t> </a:t>
             </a:r>
-            <a:endParaRPr>
-              <a:solidFill>
-                <a:schemeClr val="dk2"/>
-              </a:solidFill>
-            </a:endParaRPr>
+            <a:endParaRPr b="0" sz="1000"/>
           </a:p>
         </p:txBody>
       </p:sp>
@@ -10493,7 +10511,7 @@
   <p:cSld>
     <p:spTree>
       <p:nvGrpSpPr>
-        <p:cNvPr id="79" name="Shape 79"/>
+        <p:cNvPr id="80" name="Shape 80"/>
         <p:cNvGrpSpPr/>
         <p:nvPr/>
       </p:nvGrpSpPr>
@@ -10507,7 +10525,7 @@
       </p:grpSpPr>
       <p:sp>
         <p:nvSpPr>
-          <p:cNvPr id="80" name="Google Shape;80;p15"/>
+          <p:cNvPr id="81" name="Google Shape;81;p15"/>
           <p:cNvSpPr txBox="1"/>
           <p:nvPr>
             <p:ph type="title"/>
@@ -10547,7 +10565,7 @@
       </p:sp>
       <p:sp>
         <p:nvSpPr>
-          <p:cNvPr id="81" name="Google Shape;81;p15"/>
+          <p:cNvPr id="82" name="Google Shape;82;p15"/>
           <p:cNvSpPr txBox="1"/>
           <p:nvPr>
             <p:ph idx="12" type="sldNum"/>
@@ -10555,8 +10573,8 @@
         </p:nvSpPr>
         <p:spPr>
           <a:xfrm>
-            <a:off x="7315202" y="4416550"/>
-            <a:ext cx="1828800" cy="731400"/>
+            <a:off x="7315209" y="4229101"/>
+            <a:ext cx="1828800" cy="914400"/>
           </a:xfrm>
           <a:prstGeom prst="rect">
             <a:avLst/>
@@ -10594,33 +10612,25 @@
               <a:buNone/>
             </a:pPr>
             <a:r>
-              <a:rPr b="0" lang="en" sz="900" u="sng">
+              <a:rPr b="0" lang="en" sz="1000" u="sng">
                 <a:solidFill>
                   <a:schemeClr val="hlink"/>
                 </a:solidFill>
                 <a:hlinkClick r:id="rId3"/>
               </a:rPr>
-              <a:t>https://profriehle.com</a:t>
-            </a:r>
-            <a:r>
-              <a:rPr b="0" lang="en" sz="900">
-                <a:solidFill>
-                  <a:schemeClr val="dk2"/>
-                </a:solidFill>
-              </a:rPr>
+              <a:t>uni1.de/nyt</a:t>
+            </a:r>
+            <a:r>
+              <a:rPr b="0" lang="en" sz="1000"/>
               <a:t> </a:t>
             </a:r>
-            <a:endParaRPr b="0" sz="900">
-              <a:solidFill>
-                <a:schemeClr val="dk2"/>
-              </a:solidFill>
-            </a:endParaRPr>
+            <a:endParaRPr b="0" sz="1000"/>
           </a:p>
         </p:txBody>
       </p:sp>
       <p:sp>
         <p:nvSpPr>
-          <p:cNvPr id="82" name="Google Shape;82;p15"/>
+          <p:cNvPr id="83" name="Google Shape;83;p15"/>
           <p:cNvSpPr txBox="1"/>
           <p:nvPr>
             <p:ph idx="1" type="body"/>
@@ -11292,7 +11302,7 @@
   <p:cSld>
     <p:spTree>
       <p:nvGrpSpPr>
-        <p:cNvPr id="86" name="Shape 86"/>
+        <p:cNvPr id="87" name="Shape 87"/>
         <p:cNvGrpSpPr/>
         <p:nvPr/>
       </p:nvGrpSpPr>
@@ -11306,7 +11316,7 @@
       </p:grpSpPr>
       <p:sp>
         <p:nvSpPr>
-          <p:cNvPr id="87" name="Google Shape;87;p16"/>
+          <p:cNvPr id="88" name="Google Shape;88;p16"/>
           <p:cNvSpPr txBox="1"/>
           <p:nvPr>
             <p:ph type="title"/>
@@ -11346,7 +11356,7 @@
       </p:sp>
       <p:sp>
         <p:nvSpPr>
-          <p:cNvPr id="88" name="Google Shape;88;p16"/>
+          <p:cNvPr id="89" name="Google Shape;89;p16"/>
           <p:cNvSpPr txBox="1"/>
           <p:nvPr>
             <p:ph idx="12" type="sldNum"/>
@@ -11354,8 +11364,8 @@
         </p:nvSpPr>
         <p:spPr>
           <a:xfrm>
-            <a:off x="7315202" y="4416550"/>
-            <a:ext cx="1828800" cy="731400"/>
+            <a:off x="7315209" y="4229101"/>
+            <a:ext cx="1828800" cy="914400"/>
           </a:xfrm>
           <a:prstGeom prst="rect">
             <a:avLst/>
@@ -11393,33 +11403,25 @@
               <a:buNone/>
             </a:pPr>
             <a:r>
-              <a:rPr b="0" lang="en" sz="900" u="sng">
+              <a:rPr b="0" lang="en" sz="1000" u="sng">
                 <a:solidFill>
                   <a:schemeClr val="hlink"/>
                 </a:solidFill>
                 <a:hlinkClick r:id="rId3"/>
               </a:rPr>
-              <a:t>https://profriehle.com</a:t>
-            </a:r>
-            <a:r>
-              <a:rPr b="0" lang="en" sz="900">
-                <a:solidFill>
-                  <a:schemeClr val="dk2"/>
-                </a:solidFill>
-              </a:rPr>
+              <a:t>uni1.de/nyt</a:t>
+            </a:r>
+            <a:r>
+              <a:rPr b="0" lang="en" sz="1000"/>
               <a:t> </a:t>
             </a:r>
-            <a:endParaRPr b="0" sz="900">
-              <a:solidFill>
-                <a:schemeClr val="dk2"/>
-              </a:solidFill>
-            </a:endParaRPr>
+            <a:endParaRPr b="0" sz="1000"/>
           </a:p>
         </p:txBody>
       </p:sp>
       <p:sp>
         <p:nvSpPr>
-          <p:cNvPr id="89" name="Google Shape;89;p16"/>
+          <p:cNvPr id="90" name="Google Shape;90;p16"/>
           <p:cNvSpPr txBox="1"/>
           <p:nvPr>
             <p:ph idx="1" type="body"/>

</xml_diff>